<commit_message>
update 432 repo in accordance with 954 changes
</commit_message>
<xml_diff>
--- a/assets/Making_model_figures_workshop.pptx
+++ b/assets/Making_model_figures_workshop.pptx
@@ -13,13 +13,14 @@
     <p:sldId id="257" r:id="rId7"/>
     <p:sldId id="261" r:id="rId8"/>
     <p:sldId id="260" r:id="rId9"/>
-    <p:sldId id="264" r:id="rId10"/>
-    <p:sldId id="267" r:id="rId11"/>
-    <p:sldId id="269" r:id="rId12"/>
-    <p:sldId id="268" r:id="rId13"/>
-    <p:sldId id="270" r:id="rId14"/>
-    <p:sldId id="266" r:id="rId15"/>
-    <p:sldId id="263" r:id="rId16"/>
+    <p:sldId id="271" r:id="rId10"/>
+    <p:sldId id="264" r:id="rId11"/>
+    <p:sldId id="267" r:id="rId12"/>
+    <p:sldId id="269" r:id="rId13"/>
+    <p:sldId id="268" r:id="rId14"/>
+    <p:sldId id="270" r:id="rId15"/>
+    <p:sldId id="266" r:id="rId16"/>
+    <p:sldId id="263" r:id="rId17"/>
   </p:sldIdLst>
   <p:sldSz cx="12192000" cy="6858000"/>
   <p:notesSz cx="6858000" cy="9144000"/>
@@ -118,7 +119,121 @@
       </a:defRPr>
     </a:lvl9pPr>
   </p:defaultTextStyle>
+  <p:extLst>
+    <p:ext uri="{EFAFB233-063F-42B5-8137-9DF3F51BA10A}">
+      <p15:sldGuideLst xmlns:p15="http://schemas.microsoft.com/office/powerpoint/2012/main"/>
+    </p:ext>
+  </p:extLst>
 </p:presentation>
+</file>
+
+<file path=ppt/revisionInfo.xml><?xml version="1.0" encoding="utf-8"?>
+<p1510:revInfo xmlns:a="http://schemas.openxmlformats.org/drawingml/2006/main" xmlns:r="http://schemas.openxmlformats.org/officeDocument/2006/relationships" xmlns:p1510="http://schemas.microsoft.com/office/powerpoint/2015/10/main">
+  <p1510:revLst>
+    <p1510:client id="{BA5109C3-44C4-4CC1-B826-2CDA23D902F4}" v="15" dt="2025-05-12T08:20:00.362"/>
+  </p1510:revLst>
+</p1510:revInfo>
+</file>
+
+<file path=ppt/changesInfos/changesInfo1.xml><?xml version="1.0" encoding="utf-8"?>
+<pc:chgInfo xmlns:a="http://schemas.openxmlformats.org/drawingml/2006/main" xmlns:r="http://schemas.openxmlformats.org/officeDocument/2006/relationships" xmlns:ac="http://schemas.microsoft.com/office/drawing/2013/main/command" xmlns:pc="http://schemas.microsoft.com/office/powerpoint/2013/main/command">
+  <pc:docChgLst>
+    <pc:chgData name="Morgan Feeney" userId="24f92920-01b4-487e-8c07-cba698654adc" providerId="ADAL" clId="{BA5109C3-44C4-4CC1-B826-2CDA23D902F4}"/>
+    <pc:docChg chg="undo custSel addSld modSld">
+      <pc:chgData name="Morgan Feeney" userId="24f92920-01b4-487e-8c07-cba698654adc" providerId="ADAL" clId="{BA5109C3-44C4-4CC1-B826-2CDA23D902F4}" dt="2025-05-12T08:20:19.185" v="33" actId="20577"/>
+      <pc:docMkLst>
+        <pc:docMk/>
+      </pc:docMkLst>
+      <pc:sldChg chg="addSp delSp modSp new mod">
+        <pc:chgData name="Morgan Feeney" userId="24f92920-01b4-487e-8c07-cba698654adc" providerId="ADAL" clId="{BA5109C3-44C4-4CC1-B826-2CDA23D902F4}" dt="2025-05-12T08:20:19.185" v="33" actId="20577"/>
+        <pc:sldMkLst>
+          <pc:docMk/>
+          <pc:sldMk cId="387199111" sldId="271"/>
+        </pc:sldMkLst>
+        <pc:spChg chg="del">
+          <ac:chgData name="Morgan Feeney" userId="24f92920-01b4-487e-8c07-cba698654adc" providerId="ADAL" clId="{BA5109C3-44C4-4CC1-B826-2CDA23D902F4}" dt="2025-05-12T08:17:42.965" v="2" actId="478"/>
+          <ac:spMkLst>
+            <pc:docMk/>
+            <pc:sldMk cId="387199111" sldId="271"/>
+            <ac:spMk id="2" creationId="{4F621F6C-576B-4B33-D24C-ED18DA5E977F}"/>
+          </ac:spMkLst>
+        </pc:spChg>
+        <pc:spChg chg="del">
+          <ac:chgData name="Morgan Feeney" userId="24f92920-01b4-487e-8c07-cba698654adc" providerId="ADAL" clId="{BA5109C3-44C4-4CC1-B826-2CDA23D902F4}" dt="2025-05-12T08:17:41.405" v="1" actId="478"/>
+          <ac:spMkLst>
+            <pc:docMk/>
+            <pc:sldMk cId="387199111" sldId="271"/>
+            <ac:spMk id="3" creationId="{D2D9E8B0-D1DD-9EE7-732D-344D17334F9A}"/>
+          </ac:spMkLst>
+        </pc:spChg>
+        <pc:spChg chg="add mod">
+          <ac:chgData name="Morgan Feeney" userId="24f92920-01b4-487e-8c07-cba698654adc" providerId="ADAL" clId="{BA5109C3-44C4-4CC1-B826-2CDA23D902F4}" dt="2025-05-12T08:19:39.114" v="20" actId="1076"/>
+          <ac:spMkLst>
+            <pc:docMk/>
+            <pc:sldMk cId="387199111" sldId="271"/>
+            <ac:spMk id="5" creationId="{42B5E7EE-9756-AFEC-C0CB-9FD405831C0D}"/>
+          </ac:spMkLst>
+        </pc:spChg>
+        <pc:spChg chg="add mod">
+          <ac:chgData name="Morgan Feeney" userId="24f92920-01b4-487e-8c07-cba698654adc" providerId="ADAL" clId="{BA5109C3-44C4-4CC1-B826-2CDA23D902F4}" dt="2025-05-12T08:19:15.859" v="15" actId="1076"/>
+          <ac:spMkLst>
+            <pc:docMk/>
+            <pc:sldMk cId="387199111" sldId="271"/>
+            <ac:spMk id="7" creationId="{FAA0D175-871F-F5DD-2CFC-0D4CADC3EEDD}"/>
+          </ac:spMkLst>
+        </pc:spChg>
+        <pc:spChg chg="add mod">
+          <ac:chgData name="Morgan Feeney" userId="24f92920-01b4-487e-8c07-cba698654adc" providerId="ADAL" clId="{BA5109C3-44C4-4CC1-B826-2CDA23D902F4}" dt="2025-05-12T08:19:51.198" v="25" actId="20577"/>
+          <ac:spMkLst>
+            <pc:docMk/>
+            <pc:sldMk cId="387199111" sldId="271"/>
+            <ac:spMk id="10" creationId="{6263019A-58CB-2B83-C53C-46D05045C8FA}"/>
+          </ac:spMkLst>
+        </pc:spChg>
+        <pc:spChg chg="add mod">
+          <ac:chgData name="Morgan Feeney" userId="24f92920-01b4-487e-8c07-cba698654adc" providerId="ADAL" clId="{BA5109C3-44C4-4CC1-B826-2CDA23D902F4}" dt="2025-05-12T08:20:19.185" v="33" actId="20577"/>
+          <ac:spMkLst>
+            <pc:docMk/>
+            <pc:sldMk cId="387199111" sldId="271"/>
+            <ac:spMk id="11" creationId="{059AA609-1A9B-7568-9424-B8455B4788AA}"/>
+          </ac:spMkLst>
+        </pc:spChg>
+        <pc:picChg chg="add mod">
+          <ac:chgData name="Morgan Feeney" userId="24f92920-01b4-487e-8c07-cba698654adc" providerId="ADAL" clId="{BA5109C3-44C4-4CC1-B826-2CDA23D902F4}" dt="2025-05-12T08:20:10.670" v="31" actId="1076"/>
+          <ac:picMkLst>
+            <pc:docMk/>
+            <pc:sldMk cId="387199111" sldId="271"/>
+            <ac:picMk id="4" creationId="{470171EA-0CD0-9C02-6BB5-176A9F10C0C7}"/>
+          </ac:picMkLst>
+        </pc:picChg>
+        <pc:picChg chg="add mod">
+          <ac:chgData name="Morgan Feeney" userId="24f92920-01b4-487e-8c07-cba698654adc" providerId="ADAL" clId="{BA5109C3-44C4-4CC1-B826-2CDA23D902F4}" dt="2025-05-12T08:19:18.670" v="16" actId="1076"/>
+          <ac:picMkLst>
+            <pc:docMk/>
+            <pc:sldMk cId="387199111" sldId="271"/>
+            <ac:picMk id="6" creationId="{5BC4FC46-72F6-6B0A-D3B1-96EDFE99846F}"/>
+          </ac:picMkLst>
+        </pc:picChg>
+        <pc:picChg chg="add mod">
+          <ac:chgData name="Morgan Feeney" userId="24f92920-01b4-487e-8c07-cba698654adc" providerId="ADAL" clId="{BA5109C3-44C4-4CC1-B826-2CDA23D902F4}" dt="2025-05-12T08:19:11.147" v="14" actId="1076"/>
+          <ac:picMkLst>
+            <pc:docMk/>
+            <pc:sldMk cId="387199111" sldId="271"/>
+            <ac:picMk id="8" creationId="{B52038FF-D039-6EF7-D49D-4BE9D2E0F137}"/>
+          </ac:picMkLst>
+        </pc:picChg>
+        <pc:picChg chg="add mod">
+          <ac:chgData name="Morgan Feeney" userId="24f92920-01b4-487e-8c07-cba698654adc" providerId="ADAL" clId="{BA5109C3-44C4-4CC1-B826-2CDA23D902F4}" dt="2025-05-12T08:19:58.262" v="26" actId="1076"/>
+          <ac:picMkLst>
+            <pc:docMk/>
+            <pc:sldMk cId="387199111" sldId="271"/>
+            <ac:picMk id="9" creationId="{2E6CA5ED-0456-C70C-D7F6-7D09AEEE2693}"/>
+          </ac:picMkLst>
+        </pc:picChg>
+      </pc:sldChg>
+    </pc:docChg>
+  </pc:docChgLst>
+</pc:chgInfo>
 </file>
 
 <file path=ppt/slideLayouts/slideLayout1.xml><?xml version="1.0" encoding="utf-8"?>
@@ -163,7 +278,7 @@
           </a:lstStyle>
           <a:p>
             <a:r>
-              <a:rPr lang="en-US" smtClean="0"/>
+              <a:rPr lang="en-US"/>
               <a:t>Click to edit Master title style</a:t>
             </a:r>
             <a:endParaRPr lang="en-GB"/>
@@ -228,7 +343,7 @@
           </a:lstStyle>
           <a:p>
             <a:r>
-              <a:rPr lang="en-US" smtClean="0"/>
+              <a:rPr lang="en-US"/>
               <a:t>Click to edit Master subtitle style</a:t>
             </a:r>
             <a:endParaRPr lang="en-GB"/>
@@ -252,7 +367,7 @@
           <a:p>
             <a:fld id="{6D7D565D-1E9E-4EC2-AF81-849968F98E3B}" type="datetimeFigureOut">
               <a:rPr lang="en-GB" smtClean="0"/>
-              <a:t>19/10/2022</a:t>
+              <a:t>12/05/2025</a:t>
             </a:fld>
             <a:endParaRPr lang="en-GB"/>
           </a:p>
@@ -346,7 +461,7 @@
           <a:lstStyle/>
           <a:p>
             <a:r>
-              <a:rPr lang="en-US" smtClean="0"/>
+              <a:rPr lang="en-US"/>
               <a:t>Click to edit Master title style</a:t>
             </a:r>
             <a:endParaRPr lang="en-GB"/>
@@ -370,35 +485,35 @@
           <a:p>
             <a:pPr lvl="0"/>
             <a:r>
-              <a:rPr lang="en-US" smtClean="0"/>
+              <a:rPr lang="en-US"/>
               <a:t>Edit Master text styles</a:t>
             </a:r>
           </a:p>
           <a:p>
             <a:pPr lvl="1"/>
             <a:r>
-              <a:rPr lang="en-US" smtClean="0"/>
+              <a:rPr lang="en-US"/>
               <a:t>Second level</a:t>
             </a:r>
           </a:p>
           <a:p>
             <a:pPr lvl="2"/>
             <a:r>
-              <a:rPr lang="en-US" smtClean="0"/>
+              <a:rPr lang="en-US"/>
               <a:t>Third level</a:t>
             </a:r>
           </a:p>
           <a:p>
             <a:pPr lvl="3"/>
             <a:r>
-              <a:rPr lang="en-US" smtClean="0"/>
+              <a:rPr lang="en-US"/>
               <a:t>Fourth level</a:t>
             </a:r>
           </a:p>
           <a:p>
             <a:pPr lvl="4"/>
             <a:r>
-              <a:rPr lang="en-US" smtClean="0"/>
+              <a:rPr lang="en-US"/>
               <a:t>Fifth level</a:t>
             </a:r>
             <a:endParaRPr lang="en-GB"/>
@@ -422,7 +537,7 @@
           <a:p>
             <a:fld id="{6D7D565D-1E9E-4EC2-AF81-849968F98E3B}" type="datetimeFigureOut">
               <a:rPr lang="en-GB" smtClean="0"/>
-              <a:t>19/10/2022</a:t>
+              <a:t>12/05/2025</a:t>
             </a:fld>
             <a:endParaRPr lang="en-GB"/>
           </a:p>
@@ -521,7 +636,7 @@
           <a:lstStyle/>
           <a:p>
             <a:r>
-              <a:rPr lang="en-US" smtClean="0"/>
+              <a:rPr lang="en-US"/>
               <a:t>Click to edit Master title style</a:t>
             </a:r>
             <a:endParaRPr lang="en-GB"/>
@@ -550,35 +665,35 @@
           <a:p>
             <a:pPr lvl="0"/>
             <a:r>
-              <a:rPr lang="en-US" smtClean="0"/>
+              <a:rPr lang="en-US"/>
               <a:t>Edit Master text styles</a:t>
             </a:r>
           </a:p>
           <a:p>
             <a:pPr lvl="1"/>
             <a:r>
-              <a:rPr lang="en-US" smtClean="0"/>
+              <a:rPr lang="en-US"/>
               <a:t>Second level</a:t>
             </a:r>
           </a:p>
           <a:p>
             <a:pPr lvl="2"/>
             <a:r>
-              <a:rPr lang="en-US" smtClean="0"/>
+              <a:rPr lang="en-US"/>
               <a:t>Third level</a:t>
             </a:r>
           </a:p>
           <a:p>
             <a:pPr lvl="3"/>
             <a:r>
-              <a:rPr lang="en-US" smtClean="0"/>
+              <a:rPr lang="en-US"/>
               <a:t>Fourth level</a:t>
             </a:r>
           </a:p>
           <a:p>
             <a:pPr lvl="4"/>
             <a:r>
-              <a:rPr lang="en-US" smtClean="0"/>
+              <a:rPr lang="en-US"/>
               <a:t>Fifth level</a:t>
             </a:r>
             <a:endParaRPr lang="en-GB"/>
@@ -602,7 +717,7 @@
           <a:p>
             <a:fld id="{6D7D565D-1E9E-4EC2-AF81-849968F98E3B}" type="datetimeFigureOut">
               <a:rPr lang="en-GB" smtClean="0"/>
-              <a:t>19/10/2022</a:t>
+              <a:t>12/05/2025</a:t>
             </a:fld>
             <a:endParaRPr lang="en-GB"/>
           </a:p>
@@ -696,7 +811,7 @@
           <a:lstStyle/>
           <a:p>
             <a:r>
-              <a:rPr lang="en-US" smtClean="0"/>
+              <a:rPr lang="en-US"/>
               <a:t>Click to edit Master title style</a:t>
             </a:r>
             <a:endParaRPr lang="en-GB"/>
@@ -720,35 +835,35 @@
           <a:p>
             <a:pPr lvl="0"/>
             <a:r>
-              <a:rPr lang="en-US" smtClean="0"/>
+              <a:rPr lang="en-US"/>
               <a:t>Edit Master text styles</a:t>
             </a:r>
           </a:p>
           <a:p>
             <a:pPr lvl="1"/>
             <a:r>
-              <a:rPr lang="en-US" smtClean="0"/>
+              <a:rPr lang="en-US"/>
               <a:t>Second level</a:t>
             </a:r>
           </a:p>
           <a:p>
             <a:pPr lvl="2"/>
             <a:r>
-              <a:rPr lang="en-US" smtClean="0"/>
+              <a:rPr lang="en-US"/>
               <a:t>Third level</a:t>
             </a:r>
           </a:p>
           <a:p>
             <a:pPr lvl="3"/>
             <a:r>
-              <a:rPr lang="en-US" smtClean="0"/>
+              <a:rPr lang="en-US"/>
               <a:t>Fourth level</a:t>
             </a:r>
           </a:p>
           <a:p>
             <a:pPr lvl="4"/>
             <a:r>
-              <a:rPr lang="en-US" smtClean="0"/>
+              <a:rPr lang="en-US"/>
               <a:t>Fifth level</a:t>
             </a:r>
             <a:endParaRPr lang="en-GB"/>
@@ -772,7 +887,7 @@
           <a:p>
             <a:fld id="{6D7D565D-1E9E-4EC2-AF81-849968F98E3B}" type="datetimeFigureOut">
               <a:rPr lang="en-GB" smtClean="0"/>
-              <a:t>19/10/2022</a:t>
+              <a:t>12/05/2025</a:t>
             </a:fld>
             <a:endParaRPr lang="en-GB"/>
           </a:p>
@@ -875,7 +990,7 @@
           </a:lstStyle>
           <a:p>
             <a:r>
-              <a:rPr lang="en-US" smtClean="0"/>
+              <a:rPr lang="en-US"/>
               <a:t>Click to edit Master title style</a:t>
             </a:r>
             <a:endParaRPr lang="en-GB"/>
@@ -995,7 +1110,7 @@
           <a:p>
             <a:pPr lvl="0"/>
             <a:r>
-              <a:rPr lang="en-US" smtClean="0"/>
+              <a:rPr lang="en-US"/>
               <a:t>Edit Master text styles</a:t>
             </a:r>
           </a:p>
@@ -1018,7 +1133,7 @@
           <a:p>
             <a:fld id="{6D7D565D-1E9E-4EC2-AF81-849968F98E3B}" type="datetimeFigureOut">
               <a:rPr lang="en-GB" smtClean="0"/>
-              <a:t>19/10/2022</a:t>
+              <a:t>12/05/2025</a:t>
             </a:fld>
             <a:endParaRPr lang="en-GB"/>
           </a:p>
@@ -1112,7 +1227,7 @@
           <a:lstStyle/>
           <a:p>
             <a:r>
-              <a:rPr lang="en-US" smtClean="0"/>
+              <a:rPr lang="en-US"/>
               <a:t>Click to edit Master title style</a:t>
             </a:r>
             <a:endParaRPr lang="en-GB"/>
@@ -1141,35 +1256,35 @@
           <a:p>
             <a:pPr lvl="0"/>
             <a:r>
-              <a:rPr lang="en-US" smtClean="0"/>
+              <a:rPr lang="en-US"/>
               <a:t>Edit Master text styles</a:t>
             </a:r>
           </a:p>
           <a:p>
             <a:pPr lvl="1"/>
             <a:r>
-              <a:rPr lang="en-US" smtClean="0"/>
+              <a:rPr lang="en-US"/>
               <a:t>Second level</a:t>
             </a:r>
           </a:p>
           <a:p>
             <a:pPr lvl="2"/>
             <a:r>
-              <a:rPr lang="en-US" smtClean="0"/>
+              <a:rPr lang="en-US"/>
               <a:t>Third level</a:t>
             </a:r>
           </a:p>
           <a:p>
             <a:pPr lvl="3"/>
             <a:r>
-              <a:rPr lang="en-US" smtClean="0"/>
+              <a:rPr lang="en-US"/>
               <a:t>Fourth level</a:t>
             </a:r>
           </a:p>
           <a:p>
             <a:pPr lvl="4"/>
             <a:r>
-              <a:rPr lang="en-US" smtClean="0"/>
+              <a:rPr lang="en-US"/>
               <a:t>Fifth level</a:t>
             </a:r>
             <a:endParaRPr lang="en-GB"/>
@@ -1198,35 +1313,35 @@
           <a:p>
             <a:pPr lvl="0"/>
             <a:r>
-              <a:rPr lang="en-US" smtClean="0"/>
+              <a:rPr lang="en-US"/>
               <a:t>Edit Master text styles</a:t>
             </a:r>
           </a:p>
           <a:p>
             <a:pPr lvl="1"/>
             <a:r>
-              <a:rPr lang="en-US" smtClean="0"/>
+              <a:rPr lang="en-US"/>
               <a:t>Second level</a:t>
             </a:r>
           </a:p>
           <a:p>
             <a:pPr lvl="2"/>
             <a:r>
-              <a:rPr lang="en-US" smtClean="0"/>
+              <a:rPr lang="en-US"/>
               <a:t>Third level</a:t>
             </a:r>
           </a:p>
           <a:p>
             <a:pPr lvl="3"/>
             <a:r>
-              <a:rPr lang="en-US" smtClean="0"/>
+              <a:rPr lang="en-US"/>
               <a:t>Fourth level</a:t>
             </a:r>
           </a:p>
           <a:p>
             <a:pPr lvl="4"/>
             <a:r>
-              <a:rPr lang="en-US" smtClean="0"/>
+              <a:rPr lang="en-US"/>
               <a:t>Fifth level</a:t>
             </a:r>
             <a:endParaRPr lang="en-GB"/>
@@ -1250,7 +1365,7 @@
           <a:p>
             <a:fld id="{6D7D565D-1E9E-4EC2-AF81-849968F98E3B}" type="datetimeFigureOut">
               <a:rPr lang="en-GB" smtClean="0"/>
-              <a:t>19/10/2022</a:t>
+              <a:t>12/05/2025</a:t>
             </a:fld>
             <a:endParaRPr lang="en-GB"/>
           </a:p>
@@ -1349,7 +1464,7 @@
           <a:lstStyle/>
           <a:p>
             <a:r>
-              <a:rPr lang="en-US" smtClean="0"/>
+              <a:rPr lang="en-US"/>
               <a:t>Click to edit Master title style</a:t>
             </a:r>
             <a:endParaRPr lang="en-GB"/>
@@ -1415,7 +1530,7 @@
           <a:p>
             <a:pPr lvl="0"/>
             <a:r>
-              <a:rPr lang="en-US" smtClean="0"/>
+              <a:rPr lang="en-US"/>
               <a:t>Edit Master text styles</a:t>
             </a:r>
           </a:p>
@@ -1443,35 +1558,35 @@
           <a:p>
             <a:pPr lvl="0"/>
             <a:r>
-              <a:rPr lang="en-US" smtClean="0"/>
+              <a:rPr lang="en-US"/>
               <a:t>Edit Master text styles</a:t>
             </a:r>
           </a:p>
           <a:p>
             <a:pPr lvl="1"/>
             <a:r>
-              <a:rPr lang="en-US" smtClean="0"/>
+              <a:rPr lang="en-US"/>
               <a:t>Second level</a:t>
             </a:r>
           </a:p>
           <a:p>
             <a:pPr lvl="2"/>
             <a:r>
-              <a:rPr lang="en-US" smtClean="0"/>
+              <a:rPr lang="en-US"/>
               <a:t>Third level</a:t>
             </a:r>
           </a:p>
           <a:p>
             <a:pPr lvl="3"/>
             <a:r>
-              <a:rPr lang="en-US" smtClean="0"/>
+              <a:rPr lang="en-US"/>
               <a:t>Fourth level</a:t>
             </a:r>
           </a:p>
           <a:p>
             <a:pPr lvl="4"/>
             <a:r>
-              <a:rPr lang="en-US" smtClean="0"/>
+              <a:rPr lang="en-US"/>
               <a:t>Fifth level</a:t>
             </a:r>
             <a:endParaRPr lang="en-GB"/>
@@ -1537,7 +1652,7 @@
           <a:p>
             <a:pPr lvl="0"/>
             <a:r>
-              <a:rPr lang="en-US" smtClean="0"/>
+              <a:rPr lang="en-US"/>
               <a:t>Edit Master text styles</a:t>
             </a:r>
           </a:p>
@@ -1565,35 +1680,35 @@
           <a:p>
             <a:pPr lvl="0"/>
             <a:r>
-              <a:rPr lang="en-US" smtClean="0"/>
+              <a:rPr lang="en-US"/>
               <a:t>Edit Master text styles</a:t>
             </a:r>
           </a:p>
           <a:p>
             <a:pPr lvl="1"/>
             <a:r>
-              <a:rPr lang="en-US" smtClean="0"/>
+              <a:rPr lang="en-US"/>
               <a:t>Second level</a:t>
             </a:r>
           </a:p>
           <a:p>
             <a:pPr lvl="2"/>
             <a:r>
-              <a:rPr lang="en-US" smtClean="0"/>
+              <a:rPr lang="en-US"/>
               <a:t>Third level</a:t>
             </a:r>
           </a:p>
           <a:p>
             <a:pPr lvl="3"/>
             <a:r>
-              <a:rPr lang="en-US" smtClean="0"/>
+              <a:rPr lang="en-US"/>
               <a:t>Fourth level</a:t>
             </a:r>
           </a:p>
           <a:p>
             <a:pPr lvl="4"/>
             <a:r>
-              <a:rPr lang="en-US" smtClean="0"/>
+              <a:rPr lang="en-US"/>
               <a:t>Fifth level</a:t>
             </a:r>
             <a:endParaRPr lang="en-GB"/>
@@ -1617,7 +1732,7 @@
           <a:p>
             <a:fld id="{6D7D565D-1E9E-4EC2-AF81-849968F98E3B}" type="datetimeFigureOut">
               <a:rPr lang="en-GB" smtClean="0"/>
-              <a:t>19/10/2022</a:t>
+              <a:t>12/05/2025</a:t>
             </a:fld>
             <a:endParaRPr lang="en-GB"/>
           </a:p>
@@ -1711,7 +1826,7 @@
           <a:lstStyle/>
           <a:p>
             <a:r>
-              <a:rPr lang="en-US" smtClean="0"/>
+              <a:rPr lang="en-US"/>
               <a:t>Click to edit Master title style</a:t>
             </a:r>
             <a:endParaRPr lang="en-GB"/>
@@ -1735,7 +1850,7 @@
           <a:p>
             <a:fld id="{6D7D565D-1E9E-4EC2-AF81-849968F98E3B}" type="datetimeFigureOut">
               <a:rPr lang="en-GB" smtClean="0"/>
-              <a:t>19/10/2022</a:t>
+              <a:t>12/05/2025</a:t>
             </a:fld>
             <a:endParaRPr lang="en-GB"/>
           </a:p>
@@ -1830,7 +1945,7 @@
           <a:p>
             <a:fld id="{6D7D565D-1E9E-4EC2-AF81-849968F98E3B}" type="datetimeFigureOut">
               <a:rPr lang="en-GB" smtClean="0"/>
-              <a:t>19/10/2022</a:t>
+              <a:t>12/05/2025</a:t>
             </a:fld>
             <a:endParaRPr lang="en-GB"/>
           </a:p>
@@ -1933,7 +2048,7 @@
           </a:lstStyle>
           <a:p>
             <a:r>
-              <a:rPr lang="en-US" smtClean="0"/>
+              <a:rPr lang="en-US"/>
               <a:t>Click to edit Master title style</a:t>
             </a:r>
             <a:endParaRPr lang="en-GB"/>
@@ -1990,35 +2105,35 @@
           <a:p>
             <a:pPr lvl="0"/>
             <a:r>
-              <a:rPr lang="en-US" smtClean="0"/>
+              <a:rPr lang="en-US"/>
               <a:t>Edit Master text styles</a:t>
             </a:r>
           </a:p>
           <a:p>
             <a:pPr lvl="1"/>
             <a:r>
-              <a:rPr lang="en-US" smtClean="0"/>
+              <a:rPr lang="en-US"/>
               <a:t>Second level</a:t>
             </a:r>
           </a:p>
           <a:p>
             <a:pPr lvl="2"/>
             <a:r>
-              <a:rPr lang="en-US" smtClean="0"/>
+              <a:rPr lang="en-US"/>
               <a:t>Third level</a:t>
             </a:r>
           </a:p>
           <a:p>
             <a:pPr lvl="3"/>
             <a:r>
-              <a:rPr lang="en-US" smtClean="0"/>
+              <a:rPr lang="en-US"/>
               <a:t>Fourth level</a:t>
             </a:r>
           </a:p>
           <a:p>
             <a:pPr lvl="4"/>
             <a:r>
-              <a:rPr lang="en-US" smtClean="0"/>
+              <a:rPr lang="en-US"/>
               <a:t>Fifth level</a:t>
             </a:r>
             <a:endParaRPr lang="en-GB"/>
@@ -2084,7 +2199,7 @@
           <a:p>
             <a:pPr lvl="0"/>
             <a:r>
-              <a:rPr lang="en-US" smtClean="0"/>
+              <a:rPr lang="en-US"/>
               <a:t>Edit Master text styles</a:t>
             </a:r>
           </a:p>
@@ -2107,7 +2222,7 @@
           <a:p>
             <a:fld id="{6D7D565D-1E9E-4EC2-AF81-849968F98E3B}" type="datetimeFigureOut">
               <a:rPr lang="en-GB" smtClean="0"/>
-              <a:t>19/10/2022</a:t>
+              <a:t>12/05/2025</a:t>
             </a:fld>
             <a:endParaRPr lang="en-GB"/>
           </a:p>
@@ -2210,7 +2325,7 @@
           </a:lstStyle>
           <a:p>
             <a:r>
-              <a:rPr lang="en-US" smtClean="0"/>
+              <a:rPr lang="en-US"/>
               <a:t>Click to edit Master title style</a:t>
             </a:r>
             <a:endParaRPr lang="en-GB"/>
@@ -2337,7 +2452,7 @@
           <a:p>
             <a:pPr lvl="0"/>
             <a:r>
-              <a:rPr lang="en-US" smtClean="0"/>
+              <a:rPr lang="en-US"/>
               <a:t>Edit Master text styles</a:t>
             </a:r>
           </a:p>
@@ -2360,7 +2475,7 @@
           <a:p>
             <a:fld id="{6D7D565D-1E9E-4EC2-AF81-849968F98E3B}" type="datetimeFigureOut">
               <a:rPr lang="en-GB" smtClean="0"/>
-              <a:t>19/10/2022</a:t>
+              <a:t>12/05/2025</a:t>
             </a:fld>
             <a:endParaRPr lang="en-GB"/>
           </a:p>
@@ -2469,7 +2584,7 @@
           <a:lstStyle/>
           <a:p>
             <a:r>
-              <a:rPr lang="en-US" smtClean="0"/>
+              <a:rPr lang="en-US"/>
               <a:t>Click to edit Master title style</a:t>
             </a:r>
             <a:endParaRPr lang="en-GB"/>
@@ -2503,35 +2618,35 @@
           <a:p>
             <a:pPr lvl="0"/>
             <a:r>
-              <a:rPr lang="en-US" smtClean="0"/>
+              <a:rPr lang="en-US"/>
               <a:t>Edit Master text styles</a:t>
             </a:r>
           </a:p>
           <a:p>
             <a:pPr lvl="1"/>
             <a:r>
-              <a:rPr lang="en-US" smtClean="0"/>
+              <a:rPr lang="en-US"/>
               <a:t>Second level</a:t>
             </a:r>
           </a:p>
           <a:p>
             <a:pPr lvl="2"/>
             <a:r>
-              <a:rPr lang="en-US" smtClean="0"/>
+              <a:rPr lang="en-US"/>
               <a:t>Third level</a:t>
             </a:r>
           </a:p>
           <a:p>
             <a:pPr lvl="3"/>
             <a:r>
-              <a:rPr lang="en-US" smtClean="0"/>
+              <a:rPr lang="en-US"/>
               <a:t>Fourth level</a:t>
             </a:r>
           </a:p>
           <a:p>
             <a:pPr lvl="4"/>
             <a:r>
-              <a:rPr lang="en-US" smtClean="0"/>
+              <a:rPr lang="en-US"/>
               <a:t>Fifth level</a:t>
             </a:r>
             <a:endParaRPr lang="en-GB"/>
@@ -2573,7 +2688,7 @@
           <a:p>
             <a:fld id="{6D7D565D-1E9E-4EC2-AF81-849968F98E3B}" type="datetimeFigureOut">
               <a:rPr lang="en-GB" smtClean="0"/>
-              <a:t>19/10/2022</a:t>
+              <a:t>12/05/2025</a:t>
             </a:fld>
             <a:endParaRPr lang="en-GB"/>
           </a:p>
@@ -2994,10 +3109,9 @@
           <a:lstStyle/>
           <a:p>
             <a:r>
-              <a:rPr lang="en-GB" dirty="0" smtClean="0"/>
+              <a:rPr lang="en-GB" dirty="0"/>
               <a:t>Mini-discussion on model figures</a:t>
             </a:r>
-            <a:endParaRPr lang="en-GB" dirty="0"/>
           </a:p>
         </p:txBody>
       </p:sp>
@@ -3017,16 +3131,15 @@
           <a:lstStyle/>
           <a:p>
             <a:r>
-              <a:rPr lang="en-GB" dirty="0" smtClean="0"/>
+              <a:rPr lang="en-GB" dirty="0"/>
               <a:t>M. Feeney</a:t>
             </a:r>
           </a:p>
           <a:p>
             <a:r>
-              <a:rPr lang="en-GB" dirty="0" smtClean="0"/>
+              <a:rPr lang="en-GB" dirty="0"/>
               <a:t>21-10-22</a:t>
             </a:r>
-            <a:endParaRPr lang="en-GB" dirty="0"/>
           </a:p>
         </p:txBody>
       </p:sp>
@@ -3075,7 +3188,7 @@
           <a:bodyPr/>
           <a:lstStyle/>
           <a:p>
-            <a:endParaRPr lang="en-GB" dirty="0"/>
+            <a:endParaRPr lang="en-GB"/>
           </a:p>
         </p:txBody>
       </p:sp>
@@ -3091,20 +3204,55 @@
         </p:nvSpPr>
         <p:spPr/>
         <p:txBody>
-          <a:bodyPr/>
+          <a:bodyPr>
+            <a:normAutofit/>
+          </a:bodyPr>
           <a:lstStyle/>
           <a:p>
-            <a:pPr marL="0" indent="0">
-              <a:buNone/>
-            </a:pPr>
-            <a:endParaRPr lang="en-GB" dirty="0"/>
+            <a:r>
+              <a:rPr lang="en-GB" sz="4400" dirty="0"/>
+              <a:t>What are the +</a:t>
+            </a:r>
+            <a:r>
+              <a:rPr lang="en-GB" sz="4400" dirty="0" err="1"/>
+              <a:t>ves</a:t>
+            </a:r>
+            <a:r>
+              <a:rPr lang="en-GB" sz="4400" dirty="0"/>
+              <a:t>/-</a:t>
+            </a:r>
+            <a:r>
+              <a:rPr lang="en-GB" sz="4400" dirty="0" err="1"/>
+              <a:t>ves</a:t>
+            </a:r>
+            <a:r>
+              <a:rPr lang="en-GB" sz="4400" dirty="0"/>
+              <a:t> of each? </a:t>
+            </a:r>
+          </a:p>
+          <a:p>
+            <a:r>
+              <a:rPr lang="en-GB" sz="4400" dirty="0"/>
+              <a:t>In which context would you want to use each figure?</a:t>
+            </a:r>
+          </a:p>
+          <a:p>
+            <a:r>
+              <a:rPr lang="en-GB" sz="4400" dirty="0"/>
+              <a:t>How else might you illustrate </a:t>
+            </a:r>
+            <a:r>
+              <a:rPr lang="en-GB" sz="4400"/>
+              <a:t>this system?</a:t>
+            </a:r>
+            <a:endParaRPr lang="en-GB" sz="4400" dirty="0"/>
           </a:p>
         </p:txBody>
       </p:sp>
     </p:spTree>
     <p:extLst>
       <p:ext uri="{BB962C8B-B14F-4D97-AF65-F5344CB8AC3E}">
-        <p14:creationId xmlns:p14="http://schemas.microsoft.com/office/powerpoint/2010/main" val="3000951199"/>
+        <p14:creationId xmlns:p14="http://schemas.microsoft.com/office/powerpoint/2010/main" val="4002265655"/>
       </p:ext>
     </p:extLst>
   </p:cSld>
@@ -3146,7 +3294,7 @@
           <a:bodyPr/>
           <a:lstStyle/>
           <a:p>
-            <a:endParaRPr lang="en-GB"/>
+            <a:endParaRPr lang="en-GB" dirty="0"/>
           </a:p>
         </p:txBody>
       </p:sp>
@@ -3162,23 +3310,20 @@
         </p:nvSpPr>
         <p:spPr/>
         <p:txBody>
-          <a:bodyPr>
-            <a:normAutofit/>
-          </a:bodyPr>
+          <a:bodyPr/>
           <a:lstStyle/>
           <a:p>
-            <a:r>
-              <a:rPr lang="en-GB" sz="4400" dirty="0" smtClean="0"/>
-              <a:t>Flow diagrams to illustrate experimental methods</a:t>
-            </a:r>
-            <a:endParaRPr lang="en-GB" sz="4400" dirty="0"/>
+            <a:pPr marL="0" indent="0">
+              <a:buNone/>
+            </a:pPr>
+            <a:endParaRPr lang="en-GB" dirty="0"/>
           </a:p>
         </p:txBody>
       </p:sp>
     </p:spTree>
     <p:extLst>
       <p:ext uri="{BB962C8B-B14F-4D97-AF65-F5344CB8AC3E}">
-        <p14:creationId xmlns:p14="http://schemas.microsoft.com/office/powerpoint/2010/main" val="89358804"/>
+        <p14:creationId xmlns:p14="http://schemas.microsoft.com/office/powerpoint/2010/main" val="3000951199"/>
       </p:ext>
     </p:extLst>
   </p:cSld>
@@ -3234,6 +3379,79 @@
             <p:ph idx="1"/>
           </p:nvPr>
         </p:nvSpPr>
+        <p:spPr/>
+        <p:txBody>
+          <a:bodyPr>
+            <a:normAutofit/>
+          </a:bodyPr>
+          <a:lstStyle/>
+          <a:p>
+            <a:r>
+              <a:rPr lang="en-GB" sz="4400" dirty="0"/>
+              <a:t>Flow diagrams to illustrate experimental methods</a:t>
+            </a:r>
+          </a:p>
+        </p:txBody>
+      </p:sp>
+    </p:spTree>
+    <p:extLst>
+      <p:ext uri="{BB962C8B-B14F-4D97-AF65-F5344CB8AC3E}">
+        <p14:creationId xmlns:p14="http://schemas.microsoft.com/office/powerpoint/2010/main" val="89358804"/>
+      </p:ext>
+    </p:extLst>
+  </p:cSld>
+  <p:clrMapOvr>
+    <a:masterClrMapping/>
+  </p:clrMapOvr>
+</p:sld>
+</file>
+
+<file path=ppt/slides/slide13.xml><?xml version="1.0" encoding="utf-8"?>
+<p:sld xmlns:a="http://schemas.openxmlformats.org/drawingml/2006/main" xmlns:r="http://schemas.openxmlformats.org/officeDocument/2006/relationships" xmlns:p="http://schemas.openxmlformats.org/presentationml/2006/main">
+  <p:cSld>
+    <p:spTree>
+      <p:nvGrpSpPr>
+        <p:cNvPr id="1" name=""/>
+        <p:cNvGrpSpPr/>
+        <p:nvPr/>
+      </p:nvGrpSpPr>
+      <p:grpSpPr>
+        <a:xfrm>
+          <a:off x="0" y="0"/>
+          <a:ext cx="0" cy="0"/>
+          <a:chOff x="0" y="0"/>
+          <a:chExt cx="0" cy="0"/>
+        </a:xfrm>
+      </p:grpSpPr>
+      <p:sp>
+        <p:nvSpPr>
+          <p:cNvPr id="2" name="Title 1"/>
+          <p:cNvSpPr>
+            <a:spLocks noGrp="1"/>
+          </p:cNvSpPr>
+          <p:nvPr>
+            <p:ph type="title"/>
+          </p:nvPr>
+        </p:nvSpPr>
+        <p:spPr/>
+        <p:txBody>
+          <a:bodyPr/>
+          <a:lstStyle/>
+          <a:p>
+            <a:endParaRPr lang="en-GB"/>
+          </a:p>
+        </p:txBody>
+      </p:sp>
+      <p:sp>
+        <p:nvSpPr>
+          <p:cNvPr id="3" name="Content Placeholder 2"/>
+          <p:cNvSpPr>
+            <a:spLocks noGrp="1"/>
+          </p:cNvSpPr>
+          <p:nvPr>
+            <p:ph idx="1"/>
+          </p:nvPr>
+        </p:nvSpPr>
         <p:spPr>
           <a:xfrm>
             <a:off x="5915278" y="1825625"/>
@@ -3307,21 +3525,16 @@
             </a:r>
             <a:r>
               <a:rPr lang="en-GB" dirty="0"/>
-              <a:t> generations. (Online version in colour</a:t>
-            </a:r>
-            <a:r>
-              <a:rPr lang="en-GB" dirty="0" smtClean="0"/>
-              <a:t>.) (</a:t>
-            </a:r>
-            <a:r>
-              <a:rPr lang="en-GB" dirty="0" err="1" smtClean="0"/>
+              <a:t> generations. (Online version in colour.) (</a:t>
+            </a:r>
+            <a:r>
+              <a:rPr lang="en-GB" dirty="0" err="1"/>
               <a:t>Quides</a:t>
             </a:r>
             <a:r>
-              <a:rPr lang="en-GB" dirty="0" smtClean="0"/>
+              <a:rPr lang="en-GB" dirty="0"/>
               <a:t> et al 2021)</a:t>
             </a:r>
-            <a:endParaRPr lang="en-GB" dirty="0"/>
           </a:p>
         </p:txBody>
       </p:sp>
@@ -3379,80 +3592,6 @@
 </p:sld>
 </file>
 
-<file path=ppt/slides/slide13.xml><?xml version="1.0" encoding="utf-8"?>
-<p:sld xmlns:a="http://schemas.openxmlformats.org/drawingml/2006/main" xmlns:r="http://schemas.openxmlformats.org/officeDocument/2006/relationships" xmlns:p="http://schemas.openxmlformats.org/presentationml/2006/main">
-  <p:cSld>
-    <p:spTree>
-      <p:nvGrpSpPr>
-        <p:cNvPr id="1" name=""/>
-        <p:cNvGrpSpPr/>
-        <p:nvPr/>
-      </p:nvGrpSpPr>
-      <p:grpSpPr>
-        <a:xfrm>
-          <a:off x="0" y="0"/>
-          <a:ext cx="0" cy="0"/>
-          <a:chOff x="0" y="0"/>
-          <a:chExt cx="0" cy="0"/>
-        </a:xfrm>
-      </p:grpSpPr>
-      <p:sp>
-        <p:nvSpPr>
-          <p:cNvPr id="2" name="Title 1"/>
-          <p:cNvSpPr>
-            <a:spLocks noGrp="1"/>
-          </p:cNvSpPr>
-          <p:nvPr>
-            <p:ph type="title"/>
-          </p:nvPr>
-        </p:nvSpPr>
-        <p:spPr/>
-        <p:txBody>
-          <a:bodyPr/>
-          <a:lstStyle/>
-          <a:p>
-            <a:endParaRPr lang="en-GB"/>
-          </a:p>
-        </p:txBody>
-      </p:sp>
-      <p:sp>
-        <p:nvSpPr>
-          <p:cNvPr id="3" name="Content Placeholder 2"/>
-          <p:cNvSpPr>
-            <a:spLocks noGrp="1"/>
-          </p:cNvSpPr>
-          <p:nvPr>
-            <p:ph idx="1"/>
-          </p:nvPr>
-        </p:nvSpPr>
-        <p:spPr/>
-        <p:txBody>
-          <a:bodyPr>
-            <a:normAutofit/>
-          </a:bodyPr>
-          <a:lstStyle/>
-          <a:p>
-            <a:r>
-              <a:rPr lang="en-GB" sz="4400" dirty="0" smtClean="0"/>
-              <a:t>What level of detail to show (or include in the figure legend)?</a:t>
-            </a:r>
-            <a:endParaRPr lang="en-GB" sz="4400" dirty="0"/>
-          </a:p>
-        </p:txBody>
-      </p:sp>
-    </p:spTree>
-    <p:extLst>
-      <p:ext uri="{BB962C8B-B14F-4D97-AF65-F5344CB8AC3E}">
-        <p14:creationId xmlns:p14="http://schemas.microsoft.com/office/powerpoint/2010/main" val="4090330707"/>
-      </p:ext>
-    </p:extLst>
-  </p:cSld>
-  <p:clrMapOvr>
-    <a:masterClrMapping/>
-  </p:clrMapOvr>
-</p:sld>
-</file>
-
 <file path=ppt/slides/slide14.xml><?xml version="1.0" encoding="utf-8"?>
 <p:sld xmlns:a="http://schemas.openxmlformats.org/drawingml/2006/main" xmlns:r="http://schemas.openxmlformats.org/officeDocument/2006/relationships" xmlns:p="http://schemas.openxmlformats.org/presentationml/2006/main">
   <p:cSld>
@@ -3485,11 +3624,7 @@
           <a:bodyPr/>
           <a:lstStyle/>
           <a:p>
-            <a:r>
-              <a:rPr lang="en-GB" dirty="0" smtClean="0"/>
-              <a:t>A few more general notes on preparing model figures for your thesis/presentation</a:t>
-            </a:r>
-            <a:endParaRPr lang="en-GB" dirty="0"/>
+            <a:endParaRPr lang="en-GB"/>
           </a:p>
         </p:txBody>
       </p:sp>
@@ -3505,49 +3640,22 @@
         </p:nvSpPr>
         <p:spPr/>
         <p:txBody>
-          <a:bodyPr/>
+          <a:bodyPr>
+            <a:normAutofit/>
+          </a:bodyPr>
           <a:lstStyle/>
           <a:p>
             <a:r>
-              <a:rPr lang="en-GB" dirty="0" smtClean="0"/>
-              <a:t>Think about what it is you want to convey to your audience</a:t>
-            </a:r>
-          </a:p>
-          <a:p>
-            <a:r>
-              <a:rPr lang="en-GB" dirty="0" smtClean="0"/>
-              <a:t>Use colour, shapes, arrows carefully and consistently</a:t>
-            </a:r>
-          </a:p>
-          <a:p>
-            <a:r>
-              <a:rPr lang="en-GB" dirty="0" smtClean="0"/>
-              <a:t>Label or use the figure legend to clarify (what’s in your head isn’t necessarily what’s in your audience’s head)</a:t>
-            </a:r>
-          </a:p>
-          <a:p>
-            <a:r>
-              <a:rPr lang="en-GB" dirty="0" smtClean="0"/>
-              <a:t>General guidance for how to prepare figures for an audience (also applies to model figures): </a:t>
-            </a:r>
-            <a:r>
-              <a:rPr lang="en-GB" dirty="0" smtClean="0">
-                <a:hlinkClick r:id="rId2"/>
-              </a:rPr>
-              <a:t>https://sipbs-compbiol.github.io/BM432/notebooks/04-02-figure_preparation.html</a:t>
-            </a:r>
-            <a:r>
-              <a:rPr lang="en-GB" dirty="0" smtClean="0"/>
-              <a:t> </a:t>
-            </a:r>
-            <a:endParaRPr lang="en-GB" dirty="0"/>
+              <a:rPr lang="en-GB" sz="4400" dirty="0"/>
+              <a:t>What level of detail to show (or include in the figure legend)?</a:t>
+            </a:r>
           </a:p>
         </p:txBody>
       </p:sp>
     </p:spTree>
     <p:extLst>
       <p:ext uri="{BB962C8B-B14F-4D97-AF65-F5344CB8AC3E}">
-        <p14:creationId xmlns:p14="http://schemas.microsoft.com/office/powerpoint/2010/main" val="4024278859"/>
+        <p14:creationId xmlns:p14="http://schemas.microsoft.com/office/powerpoint/2010/main" val="4090330707"/>
       </p:ext>
     </p:extLst>
   </p:cSld>
@@ -3584,6 +3692,108 @@
             <p:ph type="title"/>
           </p:nvPr>
         </p:nvSpPr>
+        <p:spPr/>
+        <p:txBody>
+          <a:bodyPr/>
+          <a:lstStyle/>
+          <a:p>
+            <a:r>
+              <a:rPr lang="en-GB" dirty="0"/>
+              <a:t>A few more general notes on preparing model figures for your thesis/presentation</a:t>
+            </a:r>
+          </a:p>
+        </p:txBody>
+      </p:sp>
+      <p:sp>
+        <p:nvSpPr>
+          <p:cNvPr id="3" name="Content Placeholder 2"/>
+          <p:cNvSpPr>
+            <a:spLocks noGrp="1"/>
+          </p:cNvSpPr>
+          <p:nvPr>
+            <p:ph idx="1"/>
+          </p:nvPr>
+        </p:nvSpPr>
+        <p:spPr/>
+        <p:txBody>
+          <a:bodyPr/>
+          <a:lstStyle/>
+          <a:p>
+            <a:r>
+              <a:rPr lang="en-GB" dirty="0"/>
+              <a:t>Think about what it is you want to convey to your audience</a:t>
+            </a:r>
+          </a:p>
+          <a:p>
+            <a:r>
+              <a:rPr lang="en-GB" dirty="0"/>
+              <a:t>Use colour, shapes, arrows carefully and consistently</a:t>
+            </a:r>
+          </a:p>
+          <a:p>
+            <a:r>
+              <a:rPr lang="en-GB" dirty="0"/>
+              <a:t>Label or use the figure legend to clarify (what’s in your head isn’t necessarily what’s in your audience’s head)</a:t>
+            </a:r>
+          </a:p>
+          <a:p>
+            <a:r>
+              <a:rPr lang="en-GB" dirty="0"/>
+              <a:t>General guidance for how to prepare figures for an audience (also applies to model figures): </a:t>
+            </a:r>
+            <a:r>
+              <a:rPr lang="en-GB" dirty="0">
+                <a:hlinkClick r:id="rId2"/>
+              </a:rPr>
+              <a:t>https://sipbs-compbiol.github.io/BM432/notebooks/04-02-figure_preparation.html</a:t>
+            </a:r>
+            <a:r>
+              <a:rPr lang="en-GB" dirty="0"/>
+              <a:t> </a:t>
+            </a:r>
+          </a:p>
+        </p:txBody>
+      </p:sp>
+    </p:spTree>
+    <p:extLst>
+      <p:ext uri="{BB962C8B-B14F-4D97-AF65-F5344CB8AC3E}">
+        <p14:creationId xmlns:p14="http://schemas.microsoft.com/office/powerpoint/2010/main" val="4024278859"/>
+      </p:ext>
+    </p:extLst>
+  </p:cSld>
+  <p:clrMapOvr>
+    <a:masterClrMapping/>
+  </p:clrMapOvr>
+</p:sld>
+</file>
+
+<file path=ppt/slides/slide16.xml><?xml version="1.0" encoding="utf-8"?>
+<p:sld xmlns:a="http://schemas.openxmlformats.org/drawingml/2006/main" xmlns:r="http://schemas.openxmlformats.org/officeDocument/2006/relationships" xmlns:p="http://schemas.openxmlformats.org/presentationml/2006/main">
+  <p:cSld>
+    <p:spTree>
+      <p:nvGrpSpPr>
+        <p:cNvPr id="1" name=""/>
+        <p:cNvGrpSpPr/>
+        <p:nvPr/>
+      </p:nvGrpSpPr>
+      <p:grpSpPr>
+        <a:xfrm>
+          <a:off x="0" y="0"/>
+          <a:ext cx="0" cy="0"/>
+          <a:chOff x="0" y="0"/>
+          <a:chExt cx="0" cy="0"/>
+        </a:xfrm>
+      </p:grpSpPr>
+      <p:sp>
+        <p:nvSpPr>
+          <p:cNvPr id="2" name="Title 1"/>
+          <p:cNvSpPr>
+            <a:spLocks noGrp="1"/>
+          </p:cNvSpPr>
+          <p:nvPr>
+            <p:ph type="title"/>
+          </p:nvPr>
+        </p:nvSpPr>
         <p:spPr>
           <a:xfrm>
             <a:off x="677823" y="2243104"/>
@@ -3597,41 +3807,36 @@
           <a:lstStyle/>
           <a:p>
             <a:r>
-              <a:rPr lang="en-GB" dirty="0" err="1" smtClean="0"/>
+              <a:rPr lang="en-GB" dirty="0" err="1"/>
               <a:t>Powerpoint</a:t>
             </a:r>
-            <a:r>
-              <a:rPr lang="en-GB" dirty="0" smtClean="0"/>
-              <a:t/>
-            </a:r>
             <a:br>
-              <a:rPr lang="en-GB" dirty="0" smtClean="0"/>
+              <a:rPr lang="en-GB" dirty="0"/>
             </a:br>
             <a:r>
-              <a:rPr lang="en-GB" dirty="0" smtClean="0"/>
+              <a:rPr lang="en-GB" dirty="0"/>
               <a:t>Adobe programs (if you have them)</a:t>
             </a:r>
             <a:br>
-              <a:rPr lang="en-GB" dirty="0" smtClean="0"/>
+              <a:rPr lang="en-GB" dirty="0"/>
             </a:br>
             <a:r>
-              <a:rPr lang="en-GB" dirty="0" smtClean="0"/>
+              <a:rPr lang="en-GB" dirty="0"/>
               <a:t>Any other software you like to use</a:t>
             </a:r>
             <a:br>
-              <a:rPr lang="en-GB" dirty="0" smtClean="0"/>
+              <a:rPr lang="en-GB" dirty="0"/>
             </a:br>
             <a:r>
-              <a:rPr lang="en-GB" dirty="0" smtClean="0">
+              <a:rPr lang="en-GB" dirty="0">
                 <a:hlinkClick r:id="rId2"/>
               </a:rPr>
               <a:t>https://biorender.com/</a:t>
             </a:r>
             <a:r>
-              <a:rPr lang="en-GB" dirty="0" smtClean="0"/>
+              <a:rPr lang="en-GB" dirty="0"/>
               <a:t>  </a:t>
             </a:r>
-            <a:endParaRPr lang="en-GB" dirty="0"/>
           </a:p>
         </p:txBody>
       </p:sp>
@@ -3681,10 +3886,9 @@
           <a:lstStyle/>
           <a:p>
             <a:r>
-              <a:rPr lang="en-GB" sz="4400" dirty="0" smtClean="0"/>
+              <a:rPr lang="en-GB" sz="4400" dirty="0"/>
               <a:t>How do I make model figures?</a:t>
             </a:r>
-            <a:endParaRPr lang="en-GB" sz="4400" dirty="0"/>
           </a:p>
         </p:txBody>
       </p:sp>
@@ -3964,7 +4168,7 @@
               <a:tabLst/>
             </a:pPr>
             <a:r>
-              <a:rPr kumimoji="0" lang="en-US" altLang="en-US" sz="1800" b="0" i="0" u="none" strike="noStrike" cap="none" normalizeH="0" baseline="0" dirty="0" smtClean="0">
+              <a:rPr kumimoji="0" lang="en-US" altLang="en-US" sz="1800" b="0" i="0" u="none" strike="noStrike" cap="none" normalizeH="0" baseline="0" dirty="0">
                 <a:ln>
                   <a:noFill/>
                 </a:ln>
@@ -3978,7 +4182,7 @@
               <a:t>Figure </a:t>
             </a:r>
             <a:r>
-              <a:rPr kumimoji="0" lang="en-US" altLang="en-US" sz="1800" b="0" i="0" u="none" strike="noStrike" cap="none" normalizeH="0" baseline="0" dirty="0" smtClean="0">
+              <a:rPr kumimoji="0" lang="en-US" altLang="en-US" sz="1800" b="0" i="0" u="none" strike="noStrike" cap="none" normalizeH="0" baseline="0" dirty="0">
                 <a:ln>
                   <a:noFill/>
                 </a:ln>
@@ -3992,7 +4196,7 @@
               <a:t>12.1.6</a:t>
             </a:r>
             <a:r>
-              <a:rPr kumimoji="0" lang="en-US" altLang="en-US" sz="1800" b="0" i="0" u="none" strike="noStrike" cap="none" normalizeH="0" baseline="0" dirty="0" smtClean="0">
+              <a:rPr kumimoji="0" lang="en-US" altLang="en-US" sz="1800" b="0" i="0" u="none" strike="noStrike" cap="none" normalizeH="0" baseline="0" dirty="0">
                 <a:ln>
                   <a:noFill/>
                 </a:ln>
@@ -4006,7 +4210,7 @@
               <a:t>12.1.6: When glucose [</a:t>
             </a:r>
             <a:r>
-              <a:rPr kumimoji="0" lang="en-US" altLang="en-US" sz="1800" b="0" i="0" u="none" strike="noStrike" cap="none" normalizeH="0" baseline="0" dirty="0" err="1" smtClean="0">
+              <a:rPr kumimoji="0" lang="en-US" altLang="en-US" sz="1800" b="0" i="0" u="none" strike="noStrike" cap="none" normalizeH="0" baseline="0" dirty="0" err="1">
                 <a:ln>
                   <a:noFill/>
                 </a:ln>
@@ -4020,7 +4224,7 @@
               <a:t>Glc</a:t>
             </a:r>
             <a:r>
-              <a:rPr kumimoji="0" lang="en-US" altLang="en-US" sz="1800" b="0" i="0" u="none" strike="noStrike" cap="none" normalizeH="0" baseline="0" dirty="0" smtClean="0">
+              <a:rPr kumimoji="0" lang="en-US" altLang="en-US" sz="1800" b="0" i="0" u="none" strike="noStrike" cap="none" normalizeH="0" baseline="0" dirty="0">
                 <a:ln>
                   <a:noFill/>
                 </a:ln>
@@ -4034,7 +4238,7 @@
               <a:t>] and lactose [Lac] are both high, the lac operon is transcribed at a moderate level, because CAP (in the absence of </a:t>
             </a:r>
             <a:r>
-              <a:rPr kumimoji="0" lang="en-US" altLang="en-US" sz="1800" b="0" i="0" u="none" strike="noStrike" cap="none" normalizeH="0" baseline="0" dirty="0" err="1" smtClean="0">
+              <a:rPr kumimoji="0" lang="en-US" altLang="en-US" sz="1800" b="0" i="0" u="none" strike="noStrike" cap="none" normalizeH="0" baseline="0" dirty="0" err="1">
                 <a:ln>
                   <a:noFill/>
                 </a:ln>
@@ -4048,7 +4252,7 @@
               <a:t>cAMP</a:t>
             </a:r>
             <a:r>
-              <a:rPr kumimoji="0" lang="en-US" altLang="en-US" sz="1800" b="0" i="0" u="none" strike="noStrike" cap="none" normalizeH="0" baseline="0" dirty="0" smtClean="0">
+              <a:rPr kumimoji="0" lang="en-US" altLang="en-US" sz="1800" b="0" i="0" u="none" strike="noStrike" cap="none" normalizeH="0" baseline="0" dirty="0">
                 <a:ln>
                   <a:noFill/>
                 </a:ln>
@@ -4062,7 +4266,7 @@
               <a:t>) is unable to bind to its corresponding cis-element (yellow) and therefore cannot help to stabilize binding of </a:t>
             </a:r>
             <a:r>
-              <a:rPr kumimoji="0" lang="en-US" altLang="en-US" sz="1800" b="0" i="0" u="none" strike="noStrike" cap="none" normalizeH="0" baseline="0" dirty="0" err="1" smtClean="0">
+              <a:rPr kumimoji="0" lang="en-US" altLang="en-US" sz="1800" b="0" i="0" u="none" strike="noStrike" cap="none" normalizeH="0" baseline="0" dirty="0" err="1">
                 <a:ln>
                   <a:noFill/>
                 </a:ln>
@@ -4076,7 +4280,7 @@
               <a:t>RNApol</a:t>
             </a:r>
             <a:r>
-              <a:rPr kumimoji="0" lang="en-US" altLang="en-US" sz="1800" b="0" i="0" u="none" strike="noStrike" cap="none" normalizeH="0" baseline="0" dirty="0" smtClean="0">
+              <a:rPr kumimoji="0" lang="en-US" altLang="en-US" sz="1800" b="0" i="0" u="none" strike="noStrike" cap="none" normalizeH="0" baseline="0" dirty="0">
                 <a:ln>
                   <a:noFill/>
                 </a:ln>
@@ -4090,7 +4294,7 @@
               <a:t> at the promoter. Alternatively, when [</a:t>
             </a:r>
             <a:r>
-              <a:rPr kumimoji="0" lang="en-US" altLang="en-US" sz="1800" b="0" i="0" u="none" strike="noStrike" cap="none" normalizeH="0" baseline="0" dirty="0" err="1" smtClean="0">
+              <a:rPr kumimoji="0" lang="en-US" altLang="en-US" sz="1800" b="0" i="0" u="none" strike="noStrike" cap="none" normalizeH="0" baseline="0" dirty="0" err="1">
                 <a:ln>
                   <a:noFill/>
                 </a:ln>
@@ -4104,7 +4308,7 @@
               <a:t>Glc</a:t>
             </a:r>
             <a:r>
-              <a:rPr kumimoji="0" lang="en-US" altLang="en-US" sz="1800" b="0" i="0" u="none" strike="noStrike" cap="none" normalizeH="0" baseline="0" dirty="0" smtClean="0">
+              <a:rPr kumimoji="0" lang="en-US" altLang="en-US" sz="1800" b="0" i="0" u="none" strike="noStrike" cap="none" normalizeH="0" baseline="0" dirty="0">
                 <a:ln>
                   <a:noFill/>
                 </a:ln>
@@ -4118,7 +4322,7 @@
               <a:t>] is low, and [Lac] is high, CAP and </a:t>
             </a:r>
             <a:r>
-              <a:rPr kumimoji="0" lang="en-US" altLang="en-US" sz="1800" b="0" i="0" u="none" strike="noStrike" cap="none" normalizeH="0" baseline="0" dirty="0" err="1" smtClean="0">
+              <a:rPr kumimoji="0" lang="en-US" altLang="en-US" sz="1800" b="0" i="0" u="none" strike="noStrike" cap="none" normalizeH="0" baseline="0" dirty="0" err="1">
                 <a:ln>
                   <a:noFill/>
                 </a:ln>
@@ -4132,7 +4336,7 @@
               <a:t>cAMP</a:t>
             </a:r>
             <a:r>
-              <a:rPr kumimoji="0" lang="en-US" altLang="en-US" sz="1800" b="0" i="0" u="none" strike="noStrike" cap="none" normalizeH="0" baseline="0" dirty="0" smtClean="0">
+              <a:rPr kumimoji="0" lang="en-US" altLang="en-US" sz="1800" b="0" i="0" u="none" strike="noStrike" cap="none" normalizeH="0" baseline="0" dirty="0">
                 <a:ln>
                   <a:noFill/>
                 </a:ln>
@@ -4146,7 +4350,7 @@
               <a:t> can bind near the promoter and increase further the transcription of the lac operon. (</a:t>
             </a:r>
             <a:r>
-              <a:rPr kumimoji="0" lang="en-US" altLang="en-US" sz="1800" b="0" i="0" u="none" strike="noStrike" cap="none" normalizeH="0" baseline="0" dirty="0" err="1" smtClean="0">
+              <a:rPr kumimoji="0" lang="en-US" altLang="en-US" sz="1800" b="0" i="0" u="none" strike="noStrike" cap="none" normalizeH="0" baseline="0" dirty="0" err="1">
                 <a:ln>
                   <a:noFill/>
                 </a:ln>
@@ -4160,7 +4364,7 @@
               <a:t>Origianl</a:t>
             </a:r>
             <a:r>
-              <a:rPr kumimoji="0" lang="en-US" altLang="en-US" sz="1800" b="0" i="0" u="none" strike="noStrike" cap="none" normalizeH="0" baseline="0" dirty="0" smtClean="0">
+              <a:rPr kumimoji="0" lang="en-US" altLang="en-US" sz="1800" b="0" i="0" u="none" strike="noStrike" cap="none" normalizeH="0" baseline="0" dirty="0">
                 <a:ln>
                   <a:noFill/>
                 </a:ln>
@@ -4174,7 +4378,7 @@
               <a:t>-</a:t>
             </a:r>
             <a:r>
-              <a:rPr kumimoji="0" lang="en-US" altLang="en-US" sz="1800" b="0" i="0" u="none" strike="noStrike" cap="none" normalizeH="0" baseline="0" dirty="0" err="1" smtClean="0">
+              <a:rPr kumimoji="0" lang="en-US" altLang="en-US" sz="1800" b="0" i="0" u="none" strike="noStrike" cap="none" normalizeH="0" baseline="0" dirty="0" err="1">
                 <a:ln>
                   <a:noFill/>
                 </a:ln>
@@ -4188,7 +4392,7 @@
               <a:t>Deyholos</a:t>
             </a:r>
             <a:r>
-              <a:rPr kumimoji="0" lang="en-US" altLang="en-US" sz="1800" b="0" i="0" u="none" strike="noStrike" cap="none" normalizeH="0" baseline="0" dirty="0" smtClean="0">
+              <a:rPr kumimoji="0" lang="en-US" altLang="en-US" sz="1800" b="0" i="0" u="none" strike="noStrike" cap="none" normalizeH="0" baseline="0" dirty="0">
                 <a:ln>
                   <a:noFill/>
                 </a:ln>
@@ -4202,7 +4406,7 @@
               <a:t>-CC:AN) [From:</a:t>
             </a:r>
             <a:r>
-              <a:rPr kumimoji="0" lang="en-US" altLang="en-US" sz="1800" b="0" i="0" u="none" strike="noStrike" cap="none" normalizeH="0" dirty="0" smtClean="0">
+              <a:rPr kumimoji="0" lang="en-US" altLang="en-US" sz="1800" b="0" i="0" u="none" strike="noStrike" cap="none" normalizeH="0" dirty="0">
                 <a:ln>
                   <a:noFill/>
                 </a:ln>
@@ -4216,7 +4420,7 @@
               <a:t> Biology </a:t>
             </a:r>
             <a:r>
-              <a:rPr kumimoji="0" lang="en-US" altLang="en-US" sz="1800" b="0" i="0" u="none" strike="noStrike" cap="none" normalizeH="0" dirty="0" err="1" smtClean="0">
+              <a:rPr kumimoji="0" lang="en-US" altLang="en-US" sz="1800" b="0" i="0" u="none" strike="noStrike" cap="none" normalizeH="0" dirty="0" err="1">
                 <a:ln>
                   <a:noFill/>
                 </a:ln>
@@ -4230,7 +4434,7 @@
               <a:t>LibreTexts</a:t>
             </a:r>
             <a:r>
-              <a:rPr kumimoji="0" lang="en-US" altLang="en-US" sz="1800" b="0" i="0" u="none" strike="noStrike" cap="none" normalizeH="0" dirty="0" smtClean="0">
+              <a:rPr kumimoji="0" lang="en-US" altLang="en-US" sz="1800" b="0" i="0" u="none" strike="noStrike" cap="none" normalizeH="0" dirty="0">
                 <a:ln>
                   <a:noFill/>
                 </a:ln>
@@ -4244,7 +4448,7 @@
               <a:t>]</a:t>
             </a:r>
             <a:r>
-              <a:rPr kumimoji="0" lang="en-US" altLang="en-US" sz="1050" b="0" i="0" u="none" strike="noStrike" cap="none" normalizeH="0" baseline="0" dirty="0" smtClean="0">
+              <a:rPr kumimoji="0" lang="en-US" altLang="en-US" sz="1050" b="0" i="0" u="none" strike="noStrike" cap="none" normalizeH="0" baseline="0" dirty="0">
                 <a:ln>
                   <a:noFill/>
                 </a:ln>
@@ -4255,7 +4459,7 @@
               </a:rPr>
               <a:t>  </a:t>
             </a:r>
-            <a:endParaRPr kumimoji="0" lang="en-US" altLang="en-US" b="0" i="0" u="none" strike="noStrike" cap="none" normalizeH="0" baseline="0" dirty="0" smtClean="0">
+            <a:endParaRPr kumimoji="0" lang="en-US" altLang="en-US" b="0" i="0" u="none" strike="noStrike" cap="none" normalizeH="0" baseline="0" dirty="0">
               <a:ln>
                 <a:noFill/>
               </a:ln>
@@ -4278,13 +4482,6 @@
   <p:clrMapOvr>
     <a:masterClrMapping/>
   </p:clrMapOvr>
-  <p:timing>
-    <p:tnLst>
-      <p:par>
-        <p:cTn id="1" dur="indefinite" restart="never" nodeType="tmRoot"/>
-      </p:par>
-    </p:tnLst>
-  </p:timing>
 </p:sld>
 </file>
 
@@ -4342,16 +4539,15 @@
           <a:lstStyle/>
           <a:p>
             <a:r>
-              <a:rPr lang="en-GB" sz="4400" dirty="0" smtClean="0"/>
+              <a:rPr lang="en-GB" sz="4400" dirty="0"/>
               <a:t>What does the figure show?</a:t>
             </a:r>
           </a:p>
           <a:p>
             <a:r>
-              <a:rPr lang="en-GB" sz="4400" dirty="0" smtClean="0"/>
+              <a:rPr lang="en-GB" sz="4400" dirty="0"/>
               <a:t>What is wrong with it?</a:t>
             </a:r>
-            <a:endParaRPr lang="en-GB" sz="4400" dirty="0"/>
           </a:p>
         </p:txBody>
       </p:sp>
@@ -4422,18 +4618,17 @@
           <a:lstStyle/>
           <a:p>
             <a:r>
-              <a:rPr lang="en-GB" sz="4400" dirty="0" smtClean="0"/>
+              <a:rPr lang="en-GB" sz="4400" dirty="0"/>
               <a:t>Next slides – 4 model figures depicting the same regulatory system (</a:t>
             </a:r>
             <a:r>
-              <a:rPr lang="en-GB" sz="4400" dirty="0" err="1" smtClean="0"/>
+              <a:rPr lang="en-GB" sz="4400" dirty="0" err="1"/>
               <a:t>SigR-RsrA</a:t>
             </a:r>
             <a:r>
-              <a:rPr lang="en-GB" sz="4400" dirty="0" smtClean="0"/>
+              <a:rPr lang="en-GB" sz="4400" dirty="0"/>
               <a:t>) – which do you like best? least?</a:t>
             </a:r>
-            <a:endParaRPr lang="en-GB" sz="4400" dirty="0"/>
           </a:p>
         </p:txBody>
       </p:sp>
@@ -4518,7 +4713,7 @@
           <a:lstStyle/>
           <a:p>
             <a:r>
-              <a:rPr lang="en-GB" b="1" i="0" dirty="0" smtClean="0">
+              <a:rPr lang="en-GB" b="1" i="0" dirty="0">
                 <a:solidFill>
                   <a:srgbClr val="333333"/>
                 </a:solidFill>
@@ -4530,7 +4725,7 @@
           </a:p>
           <a:p>
             <a:r>
-              <a:rPr lang="en-GB" b="0" i="0" dirty="0" smtClean="0">
+              <a:rPr lang="en-GB" b="0" i="0" dirty="0">
                 <a:solidFill>
                   <a:srgbClr val="333333"/>
                 </a:solidFill>
@@ -4540,7 +4735,7 @@
               <a:t>Model for a feedback regulatory loop that modulates expression of the </a:t>
             </a:r>
             <a:r>
-              <a:rPr lang="en-GB" b="0" i="0" dirty="0" err="1" smtClean="0">
+              <a:rPr lang="en-GB" b="0" i="0" dirty="0" err="1">
                 <a:solidFill>
                   <a:srgbClr val="333333"/>
                 </a:solidFill>
@@ -4550,7 +4745,7 @@
               <a:t>thioredoxin</a:t>
             </a:r>
             <a:r>
-              <a:rPr lang="en-GB" b="0" i="0" dirty="0" smtClean="0">
+              <a:rPr lang="en-GB" b="0" i="0" dirty="0">
                 <a:solidFill>
                   <a:srgbClr val="333333"/>
                 </a:solidFill>
@@ -4560,7 +4755,7 @@
               <a:t> system in response to oxidative stress. Under unstressed conditions, </a:t>
             </a:r>
             <a:r>
-              <a:rPr lang="en-GB" b="0" i="0" dirty="0" err="1" smtClean="0">
+              <a:rPr lang="en-GB" b="0" i="0" dirty="0" err="1">
                 <a:solidFill>
                   <a:srgbClr val="333333"/>
                 </a:solidFill>
@@ -4570,7 +4765,7 @@
               <a:t>σ</a:t>
             </a:r>
             <a:r>
-              <a:rPr lang="en-GB" b="0" i="0" baseline="30000" dirty="0" err="1" smtClean="0">
+              <a:rPr lang="en-GB" b="0" i="0" baseline="30000" dirty="0" err="1">
                 <a:solidFill>
                   <a:srgbClr val="333333"/>
                 </a:solidFill>
@@ -4580,7 +4775,7 @@
               <a:t>R</a:t>
             </a:r>
             <a:r>
-              <a:rPr lang="en-GB" b="0" i="0" dirty="0" smtClean="0">
+              <a:rPr lang="en-GB" b="0" i="0" dirty="0">
                 <a:solidFill>
                   <a:srgbClr val="333333"/>
                 </a:solidFill>
@@ -4590,7 +4785,7 @@
               <a:t> is sequestered by binding to the reduced form of </a:t>
             </a:r>
             <a:r>
-              <a:rPr lang="en-GB" b="0" i="0" dirty="0" err="1" smtClean="0">
+              <a:rPr lang="en-GB" b="0" i="0" dirty="0" err="1">
                 <a:solidFill>
                   <a:srgbClr val="333333"/>
                 </a:solidFill>
@@ -4600,7 +4795,7 @@
               <a:t>RsrA</a:t>
             </a:r>
             <a:r>
-              <a:rPr lang="en-GB" b="0" i="0" dirty="0" smtClean="0">
+              <a:rPr lang="en-GB" b="0" i="0" dirty="0">
                 <a:solidFill>
                   <a:srgbClr val="333333"/>
                 </a:solidFill>
@@ -4610,7 +4805,7 @@
               <a:t> [</a:t>
             </a:r>
             <a:r>
-              <a:rPr lang="en-GB" b="0" i="0" dirty="0" err="1" smtClean="0">
+              <a:rPr lang="en-GB" b="0" i="0" dirty="0" err="1">
                 <a:solidFill>
                   <a:srgbClr val="333333"/>
                 </a:solidFill>
@@ -4620,7 +4815,7 @@
               <a:t>RsrA</a:t>
             </a:r>
             <a:r>
-              <a:rPr lang="en-GB" b="0" i="0" dirty="0" smtClean="0">
+              <a:rPr lang="en-GB" b="0" i="0" dirty="0">
                 <a:solidFill>
                   <a:srgbClr val="333333"/>
                 </a:solidFill>
@@ -4630,7 +4825,7 @@
               <a:t>-(SH)</a:t>
             </a:r>
             <a:r>
-              <a:rPr lang="en-GB" b="0" i="0" baseline="-25000" dirty="0" smtClean="0">
+              <a:rPr lang="en-GB" b="0" i="0" baseline="-25000" dirty="0">
                 <a:solidFill>
                   <a:srgbClr val="333333"/>
                 </a:solidFill>
@@ -4640,7 +4835,7 @@
               <a:t>2</a:t>
             </a:r>
             <a:r>
-              <a:rPr lang="en-GB" b="0" i="0" dirty="0" smtClean="0">
+              <a:rPr lang="en-GB" b="0" i="0" dirty="0">
                 <a:solidFill>
                   <a:srgbClr val="333333"/>
                 </a:solidFill>
@@ -4650,7 +4845,7 @@
               <a:t>]. Upon oxidative stress, </a:t>
             </a:r>
             <a:r>
-              <a:rPr lang="en-GB" b="0" i="0" dirty="0" err="1" smtClean="0">
+              <a:rPr lang="en-GB" b="0" i="0" dirty="0" err="1">
                 <a:solidFill>
                   <a:srgbClr val="333333"/>
                 </a:solidFill>
@@ -4660,7 +4855,7 @@
               <a:t>RsrA</a:t>
             </a:r>
             <a:r>
-              <a:rPr lang="en-GB" b="0" i="0" dirty="0" smtClean="0">
+              <a:rPr lang="en-GB" b="0" i="0" dirty="0">
                 <a:solidFill>
                   <a:srgbClr val="333333"/>
                 </a:solidFill>
@@ -4670,7 +4865,7 @@
               <a:t> is inactivated by the formation of intramolecular </a:t>
             </a:r>
             <a:r>
-              <a:rPr lang="en-GB" b="0" i="0" dirty="0" err="1" smtClean="0">
+              <a:rPr lang="en-GB" b="0" i="0" dirty="0" err="1">
                 <a:solidFill>
                   <a:srgbClr val="333333"/>
                 </a:solidFill>
@@ -4680,7 +4875,7 @@
               <a:t>disulfide</a:t>
             </a:r>
             <a:r>
-              <a:rPr lang="en-GB" b="0" i="0" dirty="0" smtClean="0">
+              <a:rPr lang="en-GB" b="0" i="0" dirty="0">
                 <a:solidFill>
                   <a:srgbClr val="333333"/>
                 </a:solidFill>
@@ -4690,7 +4885,7 @@
               <a:t> bond(s) (RsrA-S</a:t>
             </a:r>
             <a:r>
-              <a:rPr lang="en-GB" b="0" i="0" baseline="-25000" dirty="0" smtClean="0">
+              <a:rPr lang="en-GB" b="0" i="0" baseline="-25000" dirty="0">
                 <a:solidFill>
                   <a:srgbClr val="333333"/>
                 </a:solidFill>
@@ -4700,7 +4895,7 @@
               <a:t>2</a:t>
             </a:r>
             <a:r>
-              <a:rPr lang="en-GB" b="0" i="0" dirty="0" smtClean="0">
+              <a:rPr lang="en-GB" b="0" i="0" dirty="0">
                 <a:solidFill>
                   <a:srgbClr val="333333"/>
                 </a:solidFill>
@@ -4710,7 +4905,7 @@
               <a:t>), releasing </a:t>
             </a:r>
             <a:r>
-              <a:rPr lang="en-GB" b="0" i="0" dirty="0" err="1" smtClean="0">
+              <a:rPr lang="en-GB" b="0" i="0" dirty="0" err="1">
                 <a:solidFill>
                   <a:srgbClr val="333333"/>
                 </a:solidFill>
@@ -4720,7 +4915,7 @@
               <a:t>σ</a:t>
             </a:r>
             <a:r>
-              <a:rPr lang="en-GB" b="0" i="0" baseline="30000" dirty="0" err="1" smtClean="0">
+              <a:rPr lang="en-GB" b="0" i="0" baseline="30000" dirty="0" err="1">
                 <a:solidFill>
                   <a:srgbClr val="333333"/>
                 </a:solidFill>
@@ -4730,7 +4925,7 @@
               <a:t>R</a:t>
             </a:r>
             <a:r>
-              <a:rPr lang="en-GB" b="0" i="0" dirty="0" smtClean="0">
+              <a:rPr lang="en-GB" b="0" i="0" dirty="0">
                 <a:solidFill>
                   <a:srgbClr val="333333"/>
                 </a:solidFill>
@@ -4740,7 +4935,7 @@
               <a:t>. </a:t>
             </a:r>
             <a:r>
-              <a:rPr lang="en-GB" b="0" i="0" dirty="0" err="1" smtClean="0">
+              <a:rPr lang="en-GB" b="0" i="0" dirty="0" err="1">
                 <a:solidFill>
                   <a:srgbClr val="333333"/>
                 </a:solidFill>
@@ -4750,7 +4945,7 @@
               <a:t>σ</a:t>
             </a:r>
             <a:r>
-              <a:rPr lang="en-GB" b="0" i="0" baseline="30000" dirty="0" err="1" smtClean="0">
+              <a:rPr lang="en-GB" b="0" i="0" baseline="30000" dirty="0" err="1">
                 <a:solidFill>
                   <a:srgbClr val="333333"/>
                 </a:solidFill>
@@ -4760,7 +4955,7 @@
               <a:t>R</a:t>
             </a:r>
             <a:r>
-              <a:rPr lang="en-GB" b="0" i="0" dirty="0" smtClean="0">
+              <a:rPr lang="en-GB" b="0" i="0" dirty="0">
                 <a:solidFill>
                   <a:srgbClr val="333333"/>
                 </a:solidFill>
@@ -4770,7 +4965,7 @@
               <a:t> then binds core RNA polymerase and directs transcription of its own operon (</a:t>
             </a:r>
             <a:r>
-              <a:rPr lang="en-GB" b="0" i="1" dirty="0" err="1" smtClean="0">
+              <a:rPr lang="en-GB" b="0" i="1" dirty="0" err="1">
                 <a:solidFill>
                   <a:srgbClr val="333333"/>
                 </a:solidFill>
@@ -4780,7 +4975,7 @@
               <a:t>sigR-rsrA</a:t>
             </a:r>
             <a:r>
-              <a:rPr lang="en-GB" b="0" i="0" dirty="0" smtClean="0">
+              <a:rPr lang="en-GB" b="0" i="0" dirty="0">
                 <a:solidFill>
                   <a:srgbClr val="333333"/>
                 </a:solidFill>
@@ -4790,7 +4985,7 @@
               <a:t>) and the </a:t>
             </a:r>
             <a:r>
-              <a:rPr lang="en-GB" b="0" i="0" dirty="0" err="1" smtClean="0">
+              <a:rPr lang="en-GB" b="0" i="0" dirty="0" err="1">
                 <a:solidFill>
                   <a:srgbClr val="333333"/>
                 </a:solidFill>
@@ -4800,7 +4995,7 @@
               <a:t>thioredoxin</a:t>
             </a:r>
             <a:r>
-              <a:rPr lang="en-GB" b="0" i="0" dirty="0" smtClean="0">
+              <a:rPr lang="en-GB" b="0" i="0" dirty="0">
                 <a:solidFill>
                   <a:srgbClr val="333333"/>
                 </a:solidFill>
@@ -4810,7 +5005,7 @@
               <a:t> (TRX)/</a:t>
             </a:r>
             <a:r>
-              <a:rPr lang="en-GB" b="0" i="0" dirty="0" err="1" smtClean="0">
+              <a:rPr lang="en-GB" b="0" i="0" dirty="0" err="1">
                 <a:solidFill>
                   <a:srgbClr val="333333"/>
                 </a:solidFill>
@@ -4820,7 +5015,7 @@
               <a:t>thioredoxin</a:t>
             </a:r>
             <a:r>
-              <a:rPr lang="en-GB" b="0" i="0" dirty="0" smtClean="0">
+              <a:rPr lang="en-GB" b="0" i="0" dirty="0">
                 <a:solidFill>
                   <a:srgbClr val="333333"/>
                 </a:solidFill>
@@ -4830,7 +5025,7 @@
               <a:t> reductase (TR) genes (</a:t>
             </a:r>
             <a:r>
-              <a:rPr lang="en-GB" b="0" i="1" dirty="0" err="1" smtClean="0">
+              <a:rPr lang="en-GB" b="0" i="1" dirty="0" err="1">
                 <a:solidFill>
                   <a:srgbClr val="333333"/>
                 </a:solidFill>
@@ -4840,7 +5035,7 @@
               <a:t>trxBA</a:t>
             </a:r>
             <a:r>
-              <a:rPr lang="en-GB" b="0" i="0" dirty="0" smtClean="0">
+              <a:rPr lang="en-GB" b="0" i="0" dirty="0">
                 <a:solidFill>
                   <a:srgbClr val="333333"/>
                 </a:solidFill>
@@ -4850,7 +5045,7 @@
               <a:t>). The induction of the </a:t>
             </a:r>
             <a:r>
-              <a:rPr lang="en-GB" b="0" i="0" dirty="0" err="1" smtClean="0">
+              <a:rPr lang="en-GB" b="0" i="0" dirty="0" err="1">
                 <a:solidFill>
                   <a:srgbClr val="333333"/>
                 </a:solidFill>
@@ -4860,7 +5055,7 @@
               <a:t>thioredoxin</a:t>
             </a:r>
             <a:r>
-              <a:rPr lang="en-GB" b="0" i="0" dirty="0" smtClean="0">
+              <a:rPr lang="en-GB" b="0" i="0" dirty="0">
                 <a:solidFill>
                   <a:srgbClr val="333333"/>
                 </a:solidFill>
@@ -4870,7 +5065,7 @@
               <a:t> system shifts the intracellular thiol–</a:t>
             </a:r>
             <a:r>
-              <a:rPr lang="en-GB" b="0" i="0" dirty="0" err="1" smtClean="0">
+              <a:rPr lang="en-GB" b="0" i="0" dirty="0" err="1">
                 <a:solidFill>
                   <a:srgbClr val="333333"/>
                 </a:solidFill>
@@ -4880,7 +5075,7 @@
               <a:t>disulfide</a:t>
             </a:r>
             <a:r>
-              <a:rPr lang="en-GB" b="0" i="0" dirty="0" smtClean="0">
+              <a:rPr lang="en-GB" b="0" i="0" dirty="0">
                 <a:solidFill>
                   <a:srgbClr val="333333"/>
                 </a:solidFill>
@@ -4890,7 +5085,7 @@
               <a:t> balance and reduces </a:t>
             </a:r>
             <a:r>
-              <a:rPr lang="en-GB" b="0" i="0" dirty="0" err="1" smtClean="0">
+              <a:rPr lang="en-GB" b="0" i="0" dirty="0" err="1">
                 <a:solidFill>
                   <a:srgbClr val="333333"/>
                 </a:solidFill>
@@ -4900,7 +5095,7 @@
               <a:t>RsrA</a:t>
             </a:r>
             <a:r>
-              <a:rPr lang="en-GB" b="0" i="0" dirty="0" smtClean="0">
+              <a:rPr lang="en-GB" b="0" i="0" dirty="0">
                 <a:solidFill>
                   <a:srgbClr val="333333"/>
                 </a:solidFill>
@@ -4910,7 +5105,7 @@
               <a:t> to its active state in which it rebinds </a:t>
             </a:r>
             <a:r>
-              <a:rPr lang="en-GB" b="0" i="0" dirty="0" err="1" smtClean="0">
+              <a:rPr lang="en-GB" b="0" i="0" dirty="0" err="1">
                 <a:solidFill>
                   <a:srgbClr val="333333"/>
                 </a:solidFill>
@@ -4920,7 +5115,7 @@
               <a:t>σ</a:t>
             </a:r>
             <a:r>
-              <a:rPr lang="en-GB" b="0" i="0" baseline="30000" dirty="0" err="1" smtClean="0">
+              <a:rPr lang="en-GB" b="0" i="0" baseline="30000" dirty="0" err="1">
                 <a:solidFill>
                   <a:srgbClr val="333333"/>
                 </a:solidFill>
@@ -4930,7 +5125,7 @@
               <a:t>R</a:t>
             </a:r>
             <a:r>
-              <a:rPr lang="en-GB" b="0" i="0" dirty="0" smtClean="0">
+              <a:rPr lang="en-GB" b="0" i="0" dirty="0">
                 <a:solidFill>
                   <a:srgbClr val="333333"/>
                 </a:solidFill>
@@ -4939,13 +5134,6 @@
               </a:rPr>
               <a:t>, thereby returning the system to the pre-stimulus state. (Kang et al 1999)</a:t>
             </a:r>
-            <a:endParaRPr lang="en-GB" b="0" i="0" dirty="0">
-              <a:solidFill>
-                <a:srgbClr val="333333"/>
-              </a:solidFill>
-              <a:effectLst/>
-              <a:latin typeface="Montserrat"/>
-            </a:endParaRPr>
           </a:p>
         </p:txBody>
       </p:sp>
@@ -4970,10 +5158,9 @@
           <a:lstStyle/>
           <a:p>
             <a:r>
-              <a:rPr lang="en-GB" dirty="0" smtClean="0"/>
+              <a:rPr lang="en-GB" dirty="0"/>
               <a:t>A</a:t>
             </a:r>
-            <a:endParaRPr lang="en-GB" dirty="0"/>
           </a:p>
         </p:txBody>
       </p:sp>
@@ -5054,11 +5241,7 @@
             </a:r>
             <a:r>
               <a:rPr lang="en-GB" sz="2000" b="1" dirty="0"/>
-              <a:t> complex</a:t>
-            </a:r>
-            <a:r>
-              <a:rPr lang="en-GB" sz="2000" b="1" dirty="0" smtClean="0"/>
-              <a:t>. </a:t>
+              <a:t> complex. </a:t>
             </a:r>
             <a:r>
               <a:rPr lang="en-GB" sz="2000" dirty="0"/>
@@ -5192,21 +5375,16 @@
             </a:r>
             <a:r>
               <a:rPr lang="en-GB" sz="2000" dirty="0"/>
-              <a:t> reported in the present work</a:t>
-            </a:r>
-            <a:r>
-              <a:rPr lang="en-GB" sz="2000" dirty="0" smtClean="0"/>
-              <a:t>. (</a:t>
-            </a:r>
-            <a:r>
-              <a:rPr lang="en-GB" sz="2000" dirty="0" err="1" smtClean="0"/>
+              <a:t> reported in the present work. (</a:t>
+            </a:r>
+            <a:r>
+              <a:rPr lang="en-GB" sz="2000" dirty="0" err="1"/>
               <a:t>Rajasekar</a:t>
             </a:r>
             <a:r>
-              <a:rPr lang="en-GB" sz="2000" dirty="0" smtClean="0"/>
+              <a:rPr lang="en-GB" sz="2000" dirty="0"/>
               <a:t> et al 2016)</a:t>
             </a:r>
-            <a:endParaRPr lang="en-GB" sz="2000" dirty="0"/>
           </a:p>
         </p:txBody>
       </p:sp>
@@ -5275,7 +5453,6 @@
               <a:rPr lang="en-GB" dirty="0"/>
               <a:t>B</a:t>
             </a:r>
-            <a:endParaRPr lang="en-GB" dirty="0"/>
           </a:p>
         </p:txBody>
       </p:sp>
@@ -5330,10 +5507,9 @@
           <a:lstStyle/>
           <a:p>
             <a:r>
-              <a:rPr lang="en-GB" dirty="0" smtClean="0"/>
+              <a:rPr lang="en-GB" dirty="0"/>
               <a:t>C</a:t>
             </a:r>
-            <a:endParaRPr lang="en-GB" dirty="0"/>
           </a:p>
         </p:txBody>
       </p:sp>
@@ -5676,13 +5852,8 @@
             </a:r>
             <a:r>
               <a:rPr lang="en-GB" sz="1400" dirty="0"/>
-              <a:t> activity</a:t>
-            </a:r>
-            <a:r>
-              <a:rPr lang="en-GB" sz="1400" dirty="0" smtClean="0"/>
-              <a:t>. (Feeney et al 2017)</a:t>
-            </a:r>
-            <a:endParaRPr lang="en-GB" sz="1400" dirty="0"/>
+              <a:t> activity. (Feeney et al 2017)</a:t>
+            </a:r>
           </a:p>
         </p:txBody>
       </p:sp>
@@ -5981,7 +6152,7 @@
           <a:p>
             <a:pPr lvl="0"/>
             <a:r>
-              <a:rPr kumimoji="0" lang="en-US" altLang="en-US" sz="1050" b="1" i="0" u="none" strike="noStrike" cap="none" normalizeH="0" baseline="0" dirty="0" smtClean="0">
+              <a:rPr kumimoji="0" lang="en-US" altLang="en-US" sz="1050" b="1" i="0" u="none" strike="noStrike" cap="none" normalizeH="0" baseline="0" dirty="0">
                 <a:ln>
                   <a:noFill/>
                 </a:ln>
@@ -5994,7 +6165,7 @@
               <a:t>Figure 1</a:t>
             </a:r>
             <a:r>
-              <a:rPr lang="en-US" altLang="en-US" sz="1050" dirty="0" smtClean="0">
+              <a:rPr lang="en-US" altLang="en-US" sz="1050" dirty="0">
                 <a:solidFill>
                   <a:srgbClr val="1C1D1E"/>
                 </a:solidFill>
@@ -6003,7 +6174,7 @@
               <a:t>. </a:t>
             </a:r>
             <a:r>
-              <a:rPr kumimoji="0" lang="en-US" altLang="en-US" sz="1050" b="0" i="0" u="none" strike="noStrike" cap="none" normalizeH="0" baseline="0" dirty="0" err="1" smtClean="0">
+              <a:rPr kumimoji="0" lang="en-US" altLang="en-US" sz="1050" b="0" i="0" u="none" strike="noStrike" cap="none" normalizeH="0" baseline="0" dirty="0" err="1">
                 <a:ln>
                   <a:noFill/>
                 </a:ln>
@@ -6016,7 +6187,7 @@
               <a:t>σ</a:t>
             </a:r>
             <a:r>
-              <a:rPr kumimoji="0" lang="en-US" altLang="en-US" sz="1050" b="0" i="0" u="none" strike="noStrike" cap="none" normalizeH="0" baseline="30000" dirty="0" err="1" smtClean="0">
+              <a:rPr kumimoji="0" lang="en-US" altLang="en-US" sz="1050" b="0" i="0" u="none" strike="noStrike" cap="none" normalizeH="0" baseline="30000" dirty="0" err="1">
                 <a:ln>
                   <a:noFill/>
                 </a:ln>
@@ -6029,7 +6200,7 @@
               <a:t>R</a:t>
             </a:r>
             <a:r>
-              <a:rPr kumimoji="0" lang="en-US" altLang="en-US" sz="1050" b="0" i="0" u="none" strike="noStrike" cap="none" normalizeH="0" baseline="0" dirty="0" smtClean="0">
+              <a:rPr kumimoji="0" lang="en-US" altLang="en-US" sz="1050" b="0" i="0" u="none" strike="noStrike" cap="none" normalizeH="0" baseline="0" dirty="0">
                 <a:ln>
                   <a:noFill/>
                 </a:ln>
@@ -6042,7 +6213,7 @@
               <a:t> activation by thiol-perturbing and antibiotic stresses. Two promoters of the </a:t>
             </a:r>
             <a:r>
-              <a:rPr kumimoji="0" lang="en-US" altLang="en-US" sz="1050" b="0" i="1" u="none" strike="noStrike" cap="none" normalizeH="0" baseline="0" dirty="0" err="1" smtClean="0">
+              <a:rPr kumimoji="0" lang="en-US" altLang="en-US" sz="1050" b="0" i="1" u="none" strike="noStrike" cap="none" normalizeH="0" baseline="0" dirty="0" err="1">
                 <a:ln>
                   <a:noFill/>
                 </a:ln>
@@ -6055,7 +6226,7 @@
               <a:t>sigR-rsrA</a:t>
             </a:r>
             <a:r>
-              <a:rPr kumimoji="0" lang="en-US" altLang="en-US" sz="1050" b="0" i="0" u="none" strike="noStrike" cap="none" normalizeH="0" baseline="0" dirty="0" smtClean="0">
+              <a:rPr kumimoji="0" lang="en-US" altLang="en-US" sz="1050" b="0" i="0" u="none" strike="noStrike" cap="none" normalizeH="0" baseline="0" dirty="0">
                 <a:ln>
                   <a:noFill/>
                 </a:ln>
@@ -6068,7 +6239,7 @@
               <a:t> operon, </a:t>
             </a:r>
             <a:r>
-              <a:rPr kumimoji="0" lang="en-US" altLang="en-US" sz="1050" b="0" i="1" u="none" strike="noStrike" cap="none" normalizeH="0" baseline="0" dirty="0" smtClean="0">
+              <a:rPr kumimoji="0" lang="en-US" altLang="en-US" sz="1050" b="0" i="1" u="none" strike="noStrike" cap="none" normalizeH="0" baseline="0" dirty="0">
                 <a:ln>
                   <a:noFill/>
                 </a:ln>
@@ -6081,7 +6252,7 @@
               <a:t>sigR</a:t>
             </a:r>
             <a:r>
-              <a:rPr kumimoji="0" lang="en-US" altLang="en-US" sz="1050" b="0" i="0" u="none" strike="noStrike" cap="none" normalizeH="0" baseline="0" dirty="0" smtClean="0">
+              <a:rPr kumimoji="0" lang="en-US" altLang="en-US" sz="1050" b="0" i="0" u="none" strike="noStrike" cap="none" normalizeH="0" baseline="0" dirty="0">
                 <a:ln>
                   <a:noFill/>
                 </a:ln>
@@ -6094,7 +6265,7 @@
               <a:t>p1 and </a:t>
             </a:r>
             <a:r>
-              <a:rPr kumimoji="0" lang="en-US" altLang="en-US" sz="1050" b="0" i="1" u="none" strike="noStrike" cap="none" normalizeH="0" baseline="0" dirty="0" smtClean="0">
+              <a:rPr kumimoji="0" lang="en-US" altLang="en-US" sz="1050" b="0" i="1" u="none" strike="noStrike" cap="none" normalizeH="0" baseline="0" dirty="0">
                 <a:ln>
                   <a:noFill/>
                 </a:ln>
@@ -6107,7 +6278,7 @@
               <a:t>sigR</a:t>
             </a:r>
             <a:r>
-              <a:rPr kumimoji="0" lang="en-US" altLang="en-US" sz="1050" b="0" i="0" u="none" strike="noStrike" cap="none" normalizeH="0" baseline="0" dirty="0" smtClean="0">
+              <a:rPr kumimoji="0" lang="en-US" altLang="en-US" sz="1050" b="0" i="0" u="none" strike="noStrike" cap="none" normalizeH="0" baseline="0" dirty="0">
                 <a:ln>
                   <a:noFill/>
                 </a:ln>
@@ -6120,7 +6291,7 @@
               <a:t>p2, are recognized by housekeeping sigma factors </a:t>
             </a:r>
             <a:r>
-              <a:rPr kumimoji="0" lang="en-US" altLang="en-US" sz="1050" b="0" i="0" u="none" strike="noStrike" cap="none" normalizeH="0" baseline="0" dirty="0" err="1" smtClean="0">
+              <a:rPr kumimoji="0" lang="en-US" altLang="en-US" sz="1050" b="0" i="0" u="none" strike="noStrike" cap="none" normalizeH="0" baseline="0" dirty="0" err="1">
                 <a:ln>
                   <a:noFill/>
                 </a:ln>
@@ -6133,7 +6304,7 @@
               <a:t>HrdB</a:t>
             </a:r>
             <a:r>
-              <a:rPr kumimoji="0" lang="en-US" altLang="en-US" sz="1050" b="0" i="0" u="none" strike="noStrike" cap="none" normalizeH="0" baseline="0" dirty="0" smtClean="0">
+              <a:rPr kumimoji="0" lang="en-US" altLang="en-US" sz="1050" b="0" i="0" u="none" strike="noStrike" cap="none" normalizeH="0" baseline="0" dirty="0">
                 <a:ln>
                   <a:noFill/>
                 </a:ln>
@@ -6146,7 +6317,7 @@
               <a:t> and by </a:t>
             </a:r>
             <a:r>
-              <a:rPr kumimoji="0" lang="en-US" altLang="en-US" sz="1050" b="0" i="0" u="none" strike="noStrike" cap="none" normalizeH="0" baseline="0" dirty="0" err="1" smtClean="0">
+              <a:rPr kumimoji="0" lang="en-US" altLang="en-US" sz="1050" b="0" i="0" u="none" strike="noStrike" cap="none" normalizeH="0" baseline="0" dirty="0" err="1">
                 <a:ln>
                   <a:noFill/>
                 </a:ln>
@@ -6159,7 +6330,7 @@
               <a:t>SigR</a:t>
             </a:r>
             <a:r>
-              <a:rPr kumimoji="0" lang="en-US" altLang="en-US" sz="1050" b="0" i="0" u="none" strike="noStrike" cap="none" normalizeH="0" baseline="0" dirty="0" smtClean="0">
+              <a:rPr kumimoji="0" lang="en-US" altLang="en-US" sz="1050" b="0" i="0" u="none" strike="noStrike" cap="none" normalizeH="0" baseline="0" dirty="0">
                 <a:ln>
                   <a:noFill/>
                 </a:ln>
@@ -6172,7 +6343,7 @@
               <a:t>, respectively. The </a:t>
             </a:r>
             <a:r>
-              <a:rPr kumimoji="0" lang="en-US" altLang="en-US" sz="1050" b="0" i="1" u="none" strike="noStrike" cap="none" normalizeH="0" baseline="0" dirty="0" smtClean="0">
+              <a:rPr kumimoji="0" lang="en-US" altLang="en-US" sz="1050" b="0" i="1" u="none" strike="noStrike" cap="none" normalizeH="0" baseline="0" dirty="0">
                 <a:ln>
                   <a:noFill/>
                 </a:ln>
@@ -6185,7 +6356,7 @@
               <a:t>sigR</a:t>
             </a:r>
             <a:r>
-              <a:rPr kumimoji="0" lang="en-US" altLang="en-US" sz="1050" b="0" i="0" u="none" strike="noStrike" cap="none" normalizeH="0" baseline="0" dirty="0" smtClean="0">
+              <a:rPr kumimoji="0" lang="en-US" altLang="en-US" sz="1050" b="0" i="0" u="none" strike="noStrike" cap="none" normalizeH="0" baseline="0" dirty="0">
                 <a:ln>
                   <a:noFill/>
                 </a:ln>
@@ -6198,7 +6369,7 @@
               <a:t>p1 transcript is translated from the non-canonical start codon, GTC, and produces stable </a:t>
             </a:r>
             <a:r>
-              <a:rPr kumimoji="0" lang="en-US" altLang="en-US" sz="1050" b="0" i="0" u="none" strike="noStrike" cap="none" normalizeH="0" baseline="0" dirty="0" err="1" smtClean="0">
+              <a:rPr kumimoji="0" lang="en-US" altLang="en-US" sz="1050" b="0" i="0" u="none" strike="noStrike" cap="none" normalizeH="0" baseline="0" dirty="0" err="1">
                 <a:ln>
                   <a:noFill/>
                 </a:ln>
@@ -6211,7 +6382,7 @@
               <a:t>σ</a:t>
             </a:r>
             <a:r>
-              <a:rPr kumimoji="0" lang="en-US" altLang="en-US" sz="1050" b="0" i="0" u="none" strike="noStrike" cap="none" normalizeH="0" baseline="30000" dirty="0" err="1" smtClean="0">
+              <a:rPr kumimoji="0" lang="en-US" altLang="en-US" sz="1050" b="0" i="0" u="none" strike="noStrike" cap="none" normalizeH="0" baseline="30000" dirty="0" err="1">
                 <a:ln>
                   <a:noFill/>
                 </a:ln>
@@ -6224,7 +6395,7 @@
               <a:t>R</a:t>
             </a:r>
             <a:r>
-              <a:rPr kumimoji="0" lang="en-US" altLang="en-US" sz="1050" b="0" i="0" u="none" strike="noStrike" cap="none" normalizeH="0" baseline="0" dirty="0" smtClean="0">
+              <a:rPr kumimoji="0" lang="en-US" altLang="en-US" sz="1050" b="0" i="0" u="none" strike="noStrike" cap="none" normalizeH="0" baseline="0" dirty="0">
                 <a:ln>
                   <a:noFill/>
                 </a:ln>
@@ -6237,7 +6408,7 @@
               <a:t>, whereas the </a:t>
             </a:r>
             <a:r>
-              <a:rPr kumimoji="0" lang="en-US" altLang="en-US" sz="1050" b="0" i="1" u="none" strike="noStrike" cap="none" normalizeH="0" baseline="0" dirty="0" smtClean="0">
+              <a:rPr kumimoji="0" lang="en-US" altLang="en-US" sz="1050" b="0" i="1" u="none" strike="noStrike" cap="none" normalizeH="0" baseline="0" dirty="0">
                 <a:ln>
                   <a:noFill/>
                 </a:ln>
@@ -6250,7 +6421,7 @@
               <a:t>sigR</a:t>
             </a:r>
             <a:r>
-              <a:rPr kumimoji="0" lang="en-US" altLang="en-US" sz="1050" b="0" i="0" u="none" strike="noStrike" cap="none" normalizeH="0" baseline="0" dirty="0" smtClean="0">
+              <a:rPr kumimoji="0" lang="en-US" altLang="en-US" sz="1050" b="0" i="0" u="none" strike="noStrike" cap="none" normalizeH="0" baseline="0" dirty="0">
                 <a:ln>
                   <a:noFill/>
                 </a:ln>
@@ -6263,7 +6434,7 @@
               <a:t>p2 transcript produces the isoform,  </a:t>
             </a:r>
             <a:r>
-              <a:rPr kumimoji="0" lang="en-US" altLang="en-US" sz="1050" b="0" i="0" u="none" strike="noStrike" cap="none" normalizeH="0" baseline="0" dirty="0" err="1" smtClean="0">
+              <a:rPr kumimoji="0" lang="en-US" altLang="en-US" sz="1050" b="0" i="0" u="none" strike="noStrike" cap="none" normalizeH="0" baseline="0" dirty="0" err="1">
                 <a:ln>
                   <a:noFill/>
                 </a:ln>
@@ -6276,7 +6447,7 @@
               <a:t>σ</a:t>
             </a:r>
             <a:r>
-              <a:rPr kumimoji="0" lang="en-US" altLang="en-US" sz="1050" b="0" i="0" u="none" strike="noStrike" cap="none" normalizeH="0" baseline="30000" dirty="0" err="1" smtClean="0">
+              <a:rPr kumimoji="0" lang="en-US" altLang="en-US" sz="1050" b="0" i="0" u="none" strike="noStrike" cap="none" normalizeH="0" baseline="30000" dirty="0" err="1">
                 <a:ln>
                   <a:noFill/>
                 </a:ln>
@@ -6289,7 +6460,7 @@
               <a:t>R</a:t>
             </a:r>
             <a:r>
-              <a:rPr kumimoji="0" lang="en-US" altLang="en-US" sz="1050" b="0" i="0" u="none" strike="noStrike" cap="none" normalizeH="0" baseline="30000" dirty="0" smtClean="0">
+              <a:rPr kumimoji="0" lang="en-US" altLang="en-US" sz="1050" b="0" i="0" u="none" strike="noStrike" cap="none" normalizeH="0" baseline="30000" dirty="0">
                 <a:ln>
                   <a:noFill/>
                 </a:ln>
@@ -6302,7 +6473,7 @@
               <a:t>’</a:t>
             </a:r>
             <a:r>
-              <a:rPr kumimoji="0" lang="en-US" altLang="en-US" sz="1050" b="0" i="0" u="none" strike="noStrike" cap="none" normalizeH="0" baseline="0" dirty="0" smtClean="0">
+              <a:rPr kumimoji="0" lang="en-US" altLang="en-US" sz="1050" b="0" i="0" u="none" strike="noStrike" cap="none" normalizeH="0" baseline="0" dirty="0">
                 <a:ln>
                   <a:noFill/>
                 </a:ln>
@@ -6315,7 +6486,7 @@
               <a:t> , which is N-terminally extended by 58 aa. Under unstressed reducing conditions, zinc-containing anti-sigma (ZAS) factor, </a:t>
             </a:r>
             <a:r>
-              <a:rPr kumimoji="0" lang="en-US" altLang="en-US" sz="1050" b="0" i="0" u="none" strike="noStrike" cap="none" normalizeH="0" baseline="0" dirty="0" err="1" smtClean="0">
+              <a:rPr kumimoji="0" lang="en-US" altLang="en-US" sz="1050" b="0" i="0" u="none" strike="noStrike" cap="none" normalizeH="0" baseline="0" dirty="0" err="1">
                 <a:ln>
                   <a:noFill/>
                 </a:ln>
@@ -6328,7 +6499,7 @@
               <a:t>RsrA</a:t>
             </a:r>
             <a:r>
-              <a:rPr kumimoji="0" lang="en-US" altLang="en-US" sz="1050" b="0" i="0" u="none" strike="noStrike" cap="none" normalizeH="0" baseline="0" dirty="0" smtClean="0">
+              <a:rPr kumimoji="0" lang="en-US" altLang="en-US" sz="1050" b="0" i="0" u="none" strike="noStrike" cap="none" normalizeH="0" baseline="0" dirty="0">
                 <a:ln>
                   <a:noFill/>
                 </a:ln>
@@ -6341,7 +6512,7 @@
               <a:t>, binds and sequesters </a:t>
             </a:r>
             <a:r>
-              <a:rPr kumimoji="0" lang="en-US" altLang="en-US" sz="1050" b="0" i="0" u="none" strike="noStrike" cap="none" normalizeH="0" baseline="0" dirty="0" err="1" smtClean="0">
+              <a:rPr kumimoji="0" lang="en-US" altLang="en-US" sz="1050" b="0" i="0" u="none" strike="noStrike" cap="none" normalizeH="0" baseline="0" dirty="0" err="1">
                 <a:ln>
                   <a:noFill/>
                 </a:ln>
@@ -6354,7 +6525,7 @@
               <a:t>σ</a:t>
             </a:r>
             <a:r>
-              <a:rPr kumimoji="0" lang="en-US" altLang="en-US" sz="1050" b="0" i="0" u="none" strike="noStrike" cap="none" normalizeH="0" baseline="30000" dirty="0" err="1" smtClean="0">
+              <a:rPr kumimoji="0" lang="en-US" altLang="en-US" sz="1050" b="0" i="0" u="none" strike="noStrike" cap="none" normalizeH="0" baseline="30000" dirty="0" err="1">
                 <a:ln>
                   <a:noFill/>
                 </a:ln>
@@ -6367,7 +6538,7 @@
               <a:t>R</a:t>
             </a:r>
             <a:r>
-              <a:rPr kumimoji="0" lang="en-US" altLang="en-US" sz="1050" b="0" i="0" u="none" strike="noStrike" cap="none" normalizeH="0" baseline="0" dirty="0" smtClean="0">
+              <a:rPr kumimoji="0" lang="en-US" altLang="en-US" sz="1050" b="0" i="0" u="none" strike="noStrike" cap="none" normalizeH="0" baseline="0" dirty="0">
                 <a:ln>
                   <a:noFill/>
                 </a:ln>
@@ -6380,7 +6551,7 @@
               <a:t>, thus limiting </a:t>
             </a:r>
             <a:r>
-              <a:rPr kumimoji="0" lang="en-US" altLang="en-US" sz="1050" b="0" i="1" u="none" strike="noStrike" cap="none" normalizeH="0" baseline="0" dirty="0" smtClean="0">
+              <a:rPr kumimoji="0" lang="en-US" altLang="en-US" sz="1050" b="0" i="1" u="none" strike="noStrike" cap="none" normalizeH="0" baseline="0" dirty="0">
                 <a:ln>
                   <a:noFill/>
                 </a:ln>
@@ -6393,7 +6564,7 @@
               <a:t>sigR</a:t>
             </a:r>
             <a:r>
-              <a:rPr kumimoji="0" lang="en-US" altLang="en-US" sz="1050" b="0" i="0" u="none" strike="noStrike" cap="none" normalizeH="0" baseline="0" dirty="0" smtClean="0">
+              <a:rPr kumimoji="0" lang="en-US" altLang="en-US" sz="1050" b="0" i="0" u="none" strike="noStrike" cap="none" normalizeH="0" baseline="0" dirty="0">
                 <a:ln>
                   <a:noFill/>
                 </a:ln>
@@ -6409,7 +6580,7 @@
           <a:p>
             <a:pPr lvl="0"/>
             <a:r>
-              <a:rPr kumimoji="0" lang="en-US" altLang="en-US" sz="1050" b="0" i="0" u="none" strike="noStrike" cap="none" normalizeH="0" baseline="0" dirty="0" smtClean="0">
+              <a:rPr kumimoji="0" lang="en-US" altLang="en-US" sz="1050" b="0" i="0" u="none" strike="noStrike" cap="none" normalizeH="0" baseline="0" dirty="0">
                 <a:ln>
                   <a:noFill/>
                 </a:ln>
@@ -6422,7 +6593,7 @@
               <a:t>A. A scheme under thiol-perturbing stresses. On encountering oxidants or alkylating electrophiles, conformational change occurs in </a:t>
             </a:r>
             <a:r>
-              <a:rPr kumimoji="0" lang="en-US" altLang="en-US" sz="1050" b="0" i="0" u="none" strike="noStrike" cap="none" normalizeH="0" baseline="0" dirty="0" err="1" smtClean="0">
+              <a:rPr kumimoji="0" lang="en-US" altLang="en-US" sz="1050" b="0" i="0" u="none" strike="noStrike" cap="none" normalizeH="0" baseline="0" dirty="0" err="1">
                 <a:ln>
                   <a:noFill/>
                 </a:ln>
@@ -6435,7 +6606,7 @@
               <a:t>RsrA</a:t>
             </a:r>
             <a:r>
-              <a:rPr kumimoji="0" lang="en-US" altLang="en-US" sz="1050" b="0" i="0" u="none" strike="noStrike" cap="none" normalizeH="0" baseline="0" dirty="0" smtClean="0">
+              <a:rPr kumimoji="0" lang="en-US" altLang="en-US" sz="1050" b="0" i="0" u="none" strike="noStrike" cap="none" normalizeH="0" baseline="0" dirty="0">
                 <a:ln>
                   <a:noFill/>
                 </a:ln>
@@ -6448,7 +6619,7 @@
               <a:t> via disulfide bond formation or alkylation, thus releasing </a:t>
             </a:r>
             <a:r>
-              <a:rPr kumimoji="0" lang="en-US" altLang="en-US" sz="1050" b="0" i="0" u="none" strike="noStrike" cap="none" normalizeH="0" baseline="0" dirty="0" err="1" smtClean="0">
+              <a:rPr kumimoji="0" lang="en-US" altLang="en-US" sz="1050" b="0" i="0" u="none" strike="noStrike" cap="none" normalizeH="0" baseline="0" dirty="0" err="1">
                 <a:ln>
                   <a:noFill/>
                 </a:ln>
@@ -6461,7 +6632,7 @@
               <a:t>σ</a:t>
             </a:r>
             <a:r>
-              <a:rPr kumimoji="0" lang="en-US" altLang="en-US" sz="1050" b="0" i="0" u="none" strike="noStrike" cap="none" normalizeH="0" baseline="30000" dirty="0" err="1" smtClean="0">
+              <a:rPr kumimoji="0" lang="en-US" altLang="en-US" sz="1050" b="0" i="0" u="none" strike="noStrike" cap="none" normalizeH="0" baseline="30000" dirty="0" err="1">
                 <a:ln>
                   <a:noFill/>
                 </a:ln>
@@ -6474,7 +6645,7 @@
               <a:t>R</a:t>
             </a:r>
             <a:r>
-              <a:rPr kumimoji="0" lang="en-US" altLang="en-US" sz="1050" b="0" i="0" u="none" strike="noStrike" cap="none" normalizeH="0" baseline="0" dirty="0" smtClean="0">
+              <a:rPr kumimoji="0" lang="en-US" altLang="en-US" sz="1050" b="0" i="0" u="none" strike="noStrike" cap="none" normalizeH="0" baseline="0" dirty="0">
                 <a:ln>
                   <a:noFill/>
                 </a:ln>
@@ -6487,7 +6658,7 @@
               <a:t>, which directs transcription from </a:t>
             </a:r>
             <a:r>
-              <a:rPr kumimoji="0" lang="en-US" altLang="en-US" sz="1050" b="0" i="1" u="none" strike="noStrike" cap="none" normalizeH="0" baseline="0" dirty="0" smtClean="0">
+              <a:rPr kumimoji="0" lang="en-US" altLang="en-US" sz="1050" b="0" i="1" u="none" strike="noStrike" cap="none" normalizeH="0" baseline="0" dirty="0">
                 <a:ln>
                   <a:noFill/>
                 </a:ln>
@@ -6500,7 +6671,7 @@
               <a:t>sigR</a:t>
             </a:r>
             <a:r>
-              <a:rPr kumimoji="0" lang="en-US" altLang="en-US" sz="1050" b="0" i="0" u="none" strike="noStrike" cap="none" normalizeH="0" baseline="0" dirty="0" smtClean="0">
+              <a:rPr kumimoji="0" lang="en-US" altLang="en-US" sz="1050" b="0" i="0" u="none" strike="noStrike" cap="none" normalizeH="0" baseline="0" dirty="0">
                 <a:ln>
                   <a:noFill/>
                 </a:ln>
@@ -6513,7 +6684,7 @@
               <a:t>p2, generating  </a:t>
             </a:r>
             <a:r>
-              <a:rPr kumimoji="0" lang="en-US" altLang="en-US" sz="1050" b="0" i="0" u="none" strike="noStrike" cap="none" normalizeH="0" baseline="0" dirty="0" err="1" smtClean="0">
+              <a:rPr kumimoji="0" lang="en-US" altLang="en-US" sz="1050" b="0" i="0" u="none" strike="noStrike" cap="none" normalizeH="0" baseline="0" dirty="0" err="1">
                 <a:ln>
                   <a:noFill/>
                 </a:ln>
@@ -6526,7 +6697,7 @@
               <a:t>σ</a:t>
             </a:r>
             <a:r>
-              <a:rPr kumimoji="0" lang="en-US" altLang="en-US" sz="1050" b="0" i="0" u="none" strike="noStrike" cap="none" normalizeH="0" baseline="30000" dirty="0" err="1" smtClean="0">
+              <a:rPr kumimoji="0" lang="en-US" altLang="en-US" sz="1050" b="0" i="0" u="none" strike="noStrike" cap="none" normalizeH="0" baseline="30000" dirty="0" err="1">
                 <a:ln>
                   <a:noFill/>
                 </a:ln>
@@ -6539,7 +6710,7 @@
               <a:t>R</a:t>
             </a:r>
             <a:r>
-              <a:rPr kumimoji="0" lang="en-US" altLang="en-US" sz="1050" b="0" i="0" u="none" strike="noStrike" cap="none" normalizeH="0" baseline="30000" dirty="0" smtClean="0">
+              <a:rPr kumimoji="0" lang="en-US" altLang="en-US" sz="1050" b="0" i="0" u="none" strike="noStrike" cap="none" normalizeH="0" baseline="30000" dirty="0">
                 <a:ln>
                   <a:noFill/>
                 </a:ln>
@@ -6552,7 +6723,7 @@
               <a:t>’</a:t>
             </a:r>
             <a:r>
-              <a:rPr kumimoji="0" lang="en-US" altLang="en-US" sz="1050" b="0" i="0" u="none" strike="noStrike" cap="none" normalizeH="0" baseline="0" dirty="0" smtClean="0">
+              <a:rPr kumimoji="0" lang="en-US" altLang="en-US" sz="1050" b="0" i="0" u="none" strike="noStrike" cap="none" normalizeH="0" baseline="0" dirty="0">
                 <a:ln>
                   <a:noFill/>
                 </a:ln>
@@ -6565,7 +6736,7 @@
               <a:t>. Both </a:t>
             </a:r>
             <a:r>
-              <a:rPr kumimoji="0" lang="en-US" altLang="en-US" sz="1050" b="0" i="0" u="none" strike="noStrike" cap="none" normalizeH="0" baseline="0" dirty="0" err="1" smtClean="0">
+              <a:rPr kumimoji="0" lang="en-US" altLang="en-US" sz="1050" b="0" i="0" u="none" strike="noStrike" cap="none" normalizeH="0" baseline="0" dirty="0" err="1">
                 <a:ln>
                   <a:noFill/>
                 </a:ln>
@@ -6578,7 +6749,7 @@
               <a:t>σ</a:t>
             </a:r>
             <a:r>
-              <a:rPr kumimoji="0" lang="en-US" altLang="en-US" sz="1050" b="0" i="0" u="none" strike="noStrike" cap="none" normalizeH="0" baseline="30000" dirty="0" err="1" smtClean="0">
+              <a:rPr kumimoji="0" lang="en-US" altLang="en-US" sz="1050" b="0" i="0" u="none" strike="noStrike" cap="none" normalizeH="0" baseline="30000" dirty="0" err="1">
                 <a:ln>
                   <a:noFill/>
                 </a:ln>
@@ -6591,7 +6762,7 @@
               <a:t>R</a:t>
             </a:r>
             <a:r>
-              <a:rPr kumimoji="0" lang="en-US" altLang="en-US" sz="1050" b="0" i="0" u="none" strike="noStrike" cap="none" normalizeH="0" baseline="0" dirty="0" smtClean="0">
+              <a:rPr kumimoji="0" lang="en-US" altLang="en-US" sz="1050" b="0" i="0" u="none" strike="noStrike" cap="none" normalizeH="0" baseline="0" dirty="0">
                 <a:ln>
                   <a:noFill/>
                 </a:ln>
@@ -6604,7 +6775,7 @@
               <a:t> and  </a:t>
             </a:r>
             <a:r>
-              <a:rPr kumimoji="0" lang="en-US" altLang="en-US" sz="1050" b="0" i="0" u="none" strike="noStrike" cap="none" normalizeH="0" baseline="0" dirty="0" err="1" smtClean="0">
+              <a:rPr kumimoji="0" lang="en-US" altLang="en-US" sz="1050" b="0" i="0" u="none" strike="noStrike" cap="none" normalizeH="0" baseline="0" dirty="0" err="1">
                 <a:ln>
                   <a:noFill/>
                 </a:ln>
@@ -6617,7 +6788,7 @@
               <a:t>σ</a:t>
             </a:r>
             <a:r>
-              <a:rPr kumimoji="0" lang="en-US" altLang="en-US" sz="1050" b="0" i="0" u="none" strike="noStrike" cap="none" normalizeH="0" baseline="30000" dirty="0" err="1" smtClean="0">
+              <a:rPr kumimoji="0" lang="en-US" altLang="en-US" sz="1050" b="0" i="0" u="none" strike="noStrike" cap="none" normalizeH="0" baseline="30000" dirty="0" err="1">
                 <a:ln>
                   <a:noFill/>
                 </a:ln>
@@ -6630,7 +6801,7 @@
               <a:t>R</a:t>
             </a:r>
             <a:r>
-              <a:rPr kumimoji="0" lang="en-US" altLang="en-US" sz="1050" b="0" i="0" u="none" strike="noStrike" cap="none" normalizeH="0" baseline="30000" dirty="0" smtClean="0">
+              <a:rPr kumimoji="0" lang="en-US" altLang="en-US" sz="1050" b="0" i="0" u="none" strike="noStrike" cap="none" normalizeH="0" baseline="30000" dirty="0">
                 <a:ln>
                   <a:noFill/>
                 </a:ln>
@@ -6643,7 +6814,7 @@
               <a:t>’</a:t>
             </a:r>
             <a:r>
-              <a:rPr kumimoji="0" lang="en-US" altLang="en-US" sz="1050" b="0" i="0" u="none" strike="noStrike" cap="none" normalizeH="0" baseline="0" dirty="0" smtClean="0">
+              <a:rPr kumimoji="0" lang="en-US" altLang="en-US" sz="1050" b="0" i="0" u="none" strike="noStrike" cap="none" normalizeH="0" baseline="0" dirty="0">
                 <a:ln>
                   <a:noFill/>
                 </a:ln>
@@ -6656,7 +6827,7 @@
               <a:t>  positively amplify </a:t>
             </a:r>
             <a:r>
-              <a:rPr kumimoji="0" lang="en-US" altLang="en-US" sz="1050" b="0" i="1" u="none" strike="noStrike" cap="none" normalizeH="0" baseline="0" dirty="0" err="1" smtClean="0">
+              <a:rPr kumimoji="0" lang="en-US" altLang="en-US" sz="1050" b="0" i="1" u="none" strike="noStrike" cap="none" normalizeH="0" baseline="0" dirty="0" err="1">
                 <a:ln>
                   <a:noFill/>
                 </a:ln>
@@ -6669,7 +6840,7 @@
               <a:t>sigR</a:t>
             </a:r>
             <a:r>
-              <a:rPr kumimoji="0" lang="en-US" altLang="en-US" sz="1050" b="0" i="0" u="none" strike="noStrike" cap="none" normalizeH="0" baseline="0" dirty="0" smtClean="0">
+              <a:rPr kumimoji="0" lang="en-US" altLang="en-US" sz="1050" b="0" i="0" u="none" strike="noStrike" cap="none" normalizeH="0" baseline="0" dirty="0">
                 <a:ln>
                   <a:noFill/>
                 </a:ln>
@@ -6682,7 +6853,7 @@
               <a:t> expression, and induce other </a:t>
             </a:r>
             <a:r>
-              <a:rPr kumimoji="0" lang="en-US" altLang="en-US" sz="1050" b="0" i="0" u="none" strike="noStrike" cap="none" normalizeH="0" baseline="0" dirty="0" err="1" smtClean="0">
+              <a:rPr kumimoji="0" lang="en-US" altLang="en-US" sz="1050" b="0" i="0" u="none" strike="noStrike" cap="none" normalizeH="0" baseline="0" dirty="0" err="1">
                 <a:ln>
                   <a:noFill/>
                 </a:ln>
@@ -6695,7 +6866,7 @@
               <a:t>σ</a:t>
             </a:r>
             <a:r>
-              <a:rPr kumimoji="0" lang="en-US" altLang="en-US" sz="1050" b="0" i="0" u="none" strike="noStrike" cap="none" normalizeH="0" baseline="30000" dirty="0" err="1" smtClean="0">
+              <a:rPr kumimoji="0" lang="en-US" altLang="en-US" sz="1050" b="0" i="0" u="none" strike="noStrike" cap="none" normalizeH="0" baseline="30000" dirty="0" err="1">
                 <a:ln>
                   <a:noFill/>
                 </a:ln>
@@ -6708,7 +6879,7 @@
               <a:t>R</a:t>
             </a:r>
             <a:r>
-              <a:rPr kumimoji="0" lang="en-US" altLang="en-US" sz="1050" b="0" i="0" u="none" strike="noStrike" cap="none" normalizeH="0" baseline="0" dirty="0" smtClean="0">
+              <a:rPr kumimoji="0" lang="en-US" altLang="en-US" sz="1050" b="0" i="0" u="none" strike="noStrike" cap="none" normalizeH="0" baseline="0" dirty="0">
                 <a:ln>
                   <a:noFill/>
                 </a:ln>
@@ -6721,7 +6892,7 @@
               <a:t> regulon members such as </a:t>
             </a:r>
             <a:r>
-              <a:rPr kumimoji="0" lang="en-US" altLang="en-US" sz="1050" b="0" i="0" u="none" strike="noStrike" cap="none" normalizeH="0" baseline="0" dirty="0" err="1" smtClean="0">
+              <a:rPr kumimoji="0" lang="en-US" altLang="en-US" sz="1050" b="0" i="0" u="none" strike="noStrike" cap="none" normalizeH="0" baseline="0" dirty="0" err="1">
                 <a:ln>
                   <a:noFill/>
                 </a:ln>
@@ -6734,7 +6905,7 @@
               <a:t>Trx</a:t>
             </a:r>
             <a:r>
-              <a:rPr kumimoji="0" lang="en-US" altLang="en-US" sz="1050" b="0" i="0" u="none" strike="noStrike" cap="none" normalizeH="0" baseline="0" dirty="0" smtClean="0">
+              <a:rPr kumimoji="0" lang="en-US" altLang="en-US" sz="1050" b="0" i="0" u="none" strike="noStrike" cap="none" normalizeH="0" baseline="0" dirty="0">
                 <a:ln>
                   <a:noFill/>
                 </a:ln>
@@ -6747,7 +6918,7 @@
               <a:t>, MSH and proteases.  </a:t>
             </a:r>
             <a:r>
-              <a:rPr kumimoji="0" lang="en-US" altLang="en-US" sz="1050" b="0" i="0" u="none" strike="noStrike" cap="none" normalizeH="0" baseline="0" dirty="0" err="1" smtClean="0">
+              <a:rPr kumimoji="0" lang="en-US" altLang="en-US" sz="1050" b="0" i="0" u="none" strike="noStrike" cap="none" normalizeH="0" baseline="0" dirty="0" err="1">
                 <a:ln>
                   <a:noFill/>
                 </a:ln>
@@ -6760,7 +6931,7 @@
               <a:t>σ</a:t>
             </a:r>
             <a:r>
-              <a:rPr kumimoji="0" lang="en-US" altLang="en-US" sz="1050" b="0" i="0" u="none" strike="noStrike" cap="none" normalizeH="0" baseline="30000" dirty="0" err="1" smtClean="0">
+              <a:rPr kumimoji="0" lang="en-US" altLang="en-US" sz="1050" b="0" i="0" u="none" strike="noStrike" cap="none" normalizeH="0" baseline="30000" dirty="0" err="1">
                 <a:ln>
                   <a:noFill/>
                 </a:ln>
@@ -6773,7 +6944,7 @@
               <a:t>R</a:t>
             </a:r>
             <a:r>
-              <a:rPr kumimoji="0" lang="en-US" altLang="en-US" sz="1050" b="0" i="0" u="none" strike="noStrike" cap="none" normalizeH="0" baseline="30000" dirty="0" smtClean="0">
+              <a:rPr kumimoji="0" lang="en-US" altLang="en-US" sz="1050" b="0" i="0" u="none" strike="noStrike" cap="none" normalizeH="0" baseline="30000" dirty="0">
                 <a:ln>
                   <a:noFill/>
                 </a:ln>
@@ -6786,7 +6957,7 @@
               <a:t>’</a:t>
             </a:r>
             <a:r>
-              <a:rPr kumimoji="0" lang="en-US" altLang="en-US" sz="1050" b="0" i="0" u="none" strike="noStrike" cap="none" normalizeH="0" baseline="0" dirty="0" smtClean="0">
+              <a:rPr kumimoji="0" lang="en-US" altLang="en-US" sz="1050" b="0" i="0" u="none" strike="noStrike" cap="none" normalizeH="0" baseline="0" dirty="0">
                 <a:ln>
                   <a:noFill/>
                 </a:ln>
@@ -6799,7 +6970,7 @@
               <a:t>  is rapidly degraded by induced proteases. The sequence logo determined from 108 </a:t>
             </a:r>
             <a:r>
-              <a:rPr kumimoji="0" lang="en-US" altLang="en-US" sz="1050" b="0" i="0" u="none" strike="noStrike" cap="none" normalizeH="0" baseline="0" dirty="0" err="1" smtClean="0">
+              <a:rPr kumimoji="0" lang="en-US" altLang="en-US" sz="1050" b="0" i="0" u="none" strike="noStrike" cap="none" normalizeH="0" baseline="0" dirty="0" err="1">
                 <a:ln>
                   <a:noFill/>
                 </a:ln>
@@ -6812,7 +6983,7 @@
               <a:t>σ</a:t>
             </a:r>
             <a:r>
-              <a:rPr kumimoji="0" lang="en-US" altLang="en-US" sz="1050" b="0" i="0" u="none" strike="noStrike" cap="none" normalizeH="0" baseline="30000" dirty="0" err="1" smtClean="0">
+              <a:rPr kumimoji="0" lang="en-US" altLang="en-US" sz="1050" b="0" i="0" u="none" strike="noStrike" cap="none" normalizeH="0" baseline="30000" dirty="0" err="1">
                 <a:ln>
                   <a:noFill/>
                 </a:ln>
@@ -6825,7 +6996,7 @@
               <a:t>R</a:t>
             </a:r>
             <a:r>
-              <a:rPr kumimoji="0" lang="en-US" altLang="en-US" sz="1050" b="0" i="0" u="none" strike="noStrike" cap="none" normalizeH="0" baseline="0" dirty="0" smtClean="0">
+              <a:rPr kumimoji="0" lang="en-US" altLang="en-US" sz="1050" b="0" i="0" u="none" strike="noStrike" cap="none" normalizeH="0" baseline="0" dirty="0">
                 <a:ln>
                   <a:noFill/>
                 </a:ln>
@@ -6856,7 +7027,7 @@
               <a:tabLst/>
             </a:pPr>
             <a:r>
-              <a:rPr kumimoji="0" lang="en-US" altLang="en-US" sz="1050" b="0" i="0" u="none" strike="noStrike" cap="none" normalizeH="0" baseline="0" dirty="0" smtClean="0">
+              <a:rPr kumimoji="0" lang="en-US" altLang="en-US" sz="1050" b="0" i="0" u="none" strike="noStrike" cap="none" normalizeH="0" baseline="0" dirty="0">
                 <a:ln>
                   <a:noFill/>
                 </a:ln>
@@ -6869,7 +7040,7 @@
               <a:t>B. A scheme upon encountering translation-inhibiting antibiotics. Ribosome-targeting antibiotics induce </a:t>
             </a:r>
             <a:r>
-              <a:rPr kumimoji="0" lang="en-US" altLang="en-US" sz="1050" b="0" i="1" u="none" strike="noStrike" cap="none" normalizeH="0" baseline="0" dirty="0" smtClean="0">
+              <a:rPr kumimoji="0" lang="en-US" altLang="en-US" sz="1050" b="0" i="1" u="none" strike="noStrike" cap="none" normalizeH="0" baseline="0" dirty="0">
                 <a:ln>
                   <a:noFill/>
                 </a:ln>
@@ -6882,7 +7053,7 @@
               <a:t>sigR</a:t>
             </a:r>
             <a:r>
-              <a:rPr kumimoji="0" lang="en-US" altLang="en-US" sz="1050" b="0" i="0" u="none" strike="noStrike" cap="none" normalizeH="0" baseline="0" dirty="0" smtClean="0">
+              <a:rPr kumimoji="0" lang="en-US" altLang="en-US" sz="1050" b="0" i="0" u="none" strike="noStrike" cap="none" normalizeH="0" baseline="0" dirty="0">
                 <a:ln>
                   <a:noFill/>
                 </a:ln>
@@ -6895,7 +7066,7 @@
               <a:t>p1 transcription by increasing the </a:t>
             </a:r>
             <a:r>
-              <a:rPr kumimoji="0" lang="en-US" altLang="en-US" sz="1050" b="0" i="0" u="none" strike="noStrike" cap="none" normalizeH="0" baseline="0" dirty="0" err="1" smtClean="0">
+              <a:rPr kumimoji="0" lang="en-US" altLang="en-US" sz="1050" b="0" i="0" u="none" strike="noStrike" cap="none" normalizeH="0" baseline="0" dirty="0" err="1">
                 <a:ln>
                   <a:noFill/>
                 </a:ln>
@@ -6908,7 +7079,7 @@
               <a:t>WhiB</a:t>
             </a:r>
             <a:r>
-              <a:rPr kumimoji="0" lang="en-US" altLang="en-US" sz="1050" b="0" i="0" u="none" strike="noStrike" cap="none" normalizeH="0" baseline="0" dirty="0" smtClean="0">
+              <a:rPr kumimoji="0" lang="en-US" altLang="en-US" sz="1050" b="0" i="0" u="none" strike="noStrike" cap="none" normalizeH="0" baseline="0" dirty="0">
                 <a:ln>
                   <a:noFill/>
                 </a:ln>
@@ -6921,7 +7092,7 @@
               <a:t>-like transcriptional activator </a:t>
             </a:r>
             <a:r>
-              <a:rPr kumimoji="0" lang="en-US" altLang="en-US" sz="1050" b="0" i="0" u="none" strike="noStrike" cap="none" normalizeH="0" baseline="0" dirty="0" err="1" smtClean="0">
+              <a:rPr kumimoji="0" lang="en-US" altLang="en-US" sz="1050" b="0" i="0" u="none" strike="noStrike" cap="none" normalizeH="0" baseline="0" dirty="0" err="1">
                 <a:ln>
                   <a:noFill/>
                 </a:ln>
@@ -6934,7 +7105,7 @@
               <a:t>WblC</a:t>
             </a:r>
             <a:r>
-              <a:rPr kumimoji="0" lang="en-US" altLang="en-US" sz="1050" b="0" i="0" u="none" strike="noStrike" cap="none" normalizeH="0" baseline="0" dirty="0" smtClean="0">
+              <a:rPr kumimoji="0" lang="en-US" altLang="en-US" sz="1050" b="0" i="0" u="none" strike="noStrike" cap="none" normalizeH="0" baseline="0" dirty="0">
                 <a:ln>
                   <a:noFill/>
                 </a:ln>
@@ -6947,7 +7118,7 @@
               <a:t>, which binds immediately upstream of the −35 element of </a:t>
             </a:r>
             <a:r>
-              <a:rPr kumimoji="0" lang="en-US" altLang="en-US" sz="1050" b="0" i="1" u="none" strike="noStrike" cap="none" normalizeH="0" baseline="0" dirty="0" smtClean="0">
+              <a:rPr kumimoji="0" lang="en-US" altLang="en-US" sz="1050" b="0" i="1" u="none" strike="noStrike" cap="none" normalizeH="0" baseline="0" dirty="0">
                 <a:ln>
                   <a:noFill/>
                 </a:ln>
@@ -6960,7 +7131,7 @@
               <a:t>sigR</a:t>
             </a:r>
             <a:r>
-              <a:rPr kumimoji="0" lang="en-US" altLang="en-US" sz="1050" b="0" i="0" u="none" strike="noStrike" cap="none" normalizeH="0" baseline="0" dirty="0" smtClean="0">
+              <a:rPr kumimoji="0" lang="en-US" altLang="en-US" sz="1050" b="0" i="0" u="none" strike="noStrike" cap="none" normalizeH="0" baseline="0" dirty="0">
                 <a:ln>
                   <a:noFill/>
                 </a:ln>
@@ -6973,7 +7144,7 @@
               <a:t>p1. Production of higher level of free stable </a:t>
             </a:r>
             <a:r>
-              <a:rPr kumimoji="0" lang="en-US" altLang="en-US" sz="1050" b="0" i="0" u="none" strike="noStrike" cap="none" normalizeH="0" baseline="0" dirty="0" err="1" smtClean="0">
+              <a:rPr kumimoji="0" lang="en-US" altLang="en-US" sz="1050" b="0" i="0" u="none" strike="noStrike" cap="none" normalizeH="0" baseline="0" dirty="0" err="1">
                 <a:ln>
                   <a:noFill/>
                 </a:ln>
@@ -6986,7 +7157,7 @@
               <a:t>σ</a:t>
             </a:r>
             <a:r>
-              <a:rPr kumimoji="0" lang="en-US" altLang="en-US" sz="1050" b="0" i="0" u="none" strike="noStrike" cap="none" normalizeH="0" baseline="30000" dirty="0" err="1" smtClean="0">
+              <a:rPr kumimoji="0" lang="en-US" altLang="en-US" sz="1050" b="0" i="0" u="none" strike="noStrike" cap="none" normalizeH="0" baseline="30000" dirty="0" err="1">
                 <a:ln>
                   <a:noFill/>
                 </a:ln>
@@ -6999,7 +7170,7 @@
               <a:t>R</a:t>
             </a:r>
             <a:r>
-              <a:rPr kumimoji="0" lang="en-US" altLang="en-US" sz="1050" b="0" i="0" u="none" strike="noStrike" cap="none" normalizeH="0" baseline="0" dirty="0" smtClean="0">
+              <a:rPr kumimoji="0" lang="en-US" altLang="en-US" sz="1050" b="0" i="0" u="none" strike="noStrike" cap="none" normalizeH="0" baseline="0" dirty="0">
                 <a:ln>
                   <a:noFill/>
                 </a:ln>
@@ -7012,7 +7183,7 @@
               <a:t> that exceeds the molar quantity of </a:t>
             </a:r>
             <a:r>
-              <a:rPr kumimoji="0" lang="en-US" altLang="en-US" sz="1050" b="0" i="0" u="none" strike="noStrike" cap="none" normalizeH="0" baseline="0" dirty="0" err="1" smtClean="0">
+              <a:rPr kumimoji="0" lang="en-US" altLang="en-US" sz="1050" b="0" i="0" u="none" strike="noStrike" cap="none" normalizeH="0" baseline="0" dirty="0" err="1">
                 <a:ln>
                   <a:noFill/>
                 </a:ln>
@@ -7025,7 +7196,7 @@
               <a:t>RsrA</a:t>
             </a:r>
             <a:r>
-              <a:rPr kumimoji="0" lang="en-US" altLang="en-US" sz="1050" b="0" i="0" u="none" strike="noStrike" cap="none" normalizeH="0" baseline="0" dirty="0" smtClean="0">
+              <a:rPr kumimoji="0" lang="en-US" altLang="en-US" sz="1050" b="0" i="0" u="none" strike="noStrike" cap="none" normalizeH="0" baseline="0" dirty="0">
                 <a:ln>
                   <a:noFill/>
                 </a:ln>
@@ -7038,7 +7209,7 @@
               <a:t> further amplifies the positive </a:t>
             </a:r>
             <a:r>
-              <a:rPr kumimoji="0" lang="en-US" altLang="en-US" sz="1050" b="0" i="0" u="none" strike="noStrike" cap="none" normalizeH="0" baseline="0" dirty="0" err="1" smtClean="0">
+              <a:rPr kumimoji="0" lang="en-US" altLang="en-US" sz="1050" b="0" i="0" u="none" strike="noStrike" cap="none" normalizeH="0" baseline="0" dirty="0" err="1">
                 <a:ln>
                   <a:noFill/>
                 </a:ln>
@@ -7051,7 +7222,7 @@
               <a:t>autoregulatory</a:t>
             </a:r>
             <a:r>
-              <a:rPr kumimoji="0" lang="en-US" altLang="en-US" sz="1050" b="0" i="0" u="none" strike="noStrike" cap="none" normalizeH="0" baseline="0" dirty="0" smtClean="0">
+              <a:rPr kumimoji="0" lang="en-US" altLang="en-US" sz="1050" b="0" i="0" u="none" strike="noStrike" cap="none" normalizeH="0" baseline="0" dirty="0">
                 <a:ln>
                   <a:noFill/>
                 </a:ln>
@@ -7064,7 +7235,7 @@
               <a:t> loop and results in prolonged induction of the </a:t>
             </a:r>
             <a:r>
-              <a:rPr kumimoji="0" lang="en-US" altLang="en-US" sz="1050" b="0" i="0" u="none" strike="noStrike" cap="none" normalizeH="0" baseline="0" dirty="0" err="1" smtClean="0">
+              <a:rPr kumimoji="0" lang="en-US" altLang="en-US" sz="1050" b="0" i="0" u="none" strike="noStrike" cap="none" normalizeH="0" baseline="0" dirty="0" err="1">
                 <a:ln>
                   <a:noFill/>
                 </a:ln>
@@ -7077,7 +7248,7 @@
               <a:t>σ</a:t>
             </a:r>
             <a:r>
-              <a:rPr kumimoji="0" lang="en-US" altLang="en-US" sz="1050" b="0" i="0" u="none" strike="noStrike" cap="none" normalizeH="0" baseline="30000" dirty="0" err="1" smtClean="0">
+              <a:rPr kumimoji="0" lang="en-US" altLang="en-US" sz="1050" b="0" i="0" u="none" strike="noStrike" cap="none" normalizeH="0" baseline="30000" dirty="0" err="1">
                 <a:ln>
                   <a:noFill/>
                 </a:ln>
@@ -7090,7 +7261,7 @@
               <a:t>R</a:t>
             </a:r>
             <a:r>
-              <a:rPr kumimoji="0" lang="en-US" altLang="en-US" sz="1050" b="0" i="0" u="none" strike="noStrike" cap="none" normalizeH="0" baseline="0" dirty="0" smtClean="0">
+              <a:rPr kumimoji="0" lang="en-US" altLang="en-US" sz="1050" b="0" i="0" u="none" strike="noStrike" cap="none" normalizeH="0" baseline="0" dirty="0">
                 <a:ln>
                   <a:noFill/>
                 </a:ln>
@@ -7290,10 +7461,9 @@
           <a:lstStyle/>
           <a:p>
             <a:r>
-              <a:rPr lang="en-GB" dirty="0" smtClean="0"/>
+              <a:rPr lang="en-GB" dirty="0"/>
               <a:t>D</a:t>
             </a:r>
-            <a:endParaRPr lang="en-GB" dirty="0"/>
           </a:p>
         </p:txBody>
       </p:sp>
@@ -7327,9 +7497,50 @@
           <a:chExt cx="0" cy="0"/>
         </a:xfrm>
       </p:grpSpPr>
-      <p:sp>
-        <p:nvSpPr>
-          <p:cNvPr id="2" name="Title 1"/>
+      <p:pic>
+        <p:nvPicPr>
+          <p:cNvPr id="4" name="Content Placeholder 5">
+            <a:extLst>
+              <a:ext uri="{FF2B5EF4-FFF2-40B4-BE49-F238E27FC236}">
+                <a16:creationId xmlns:a16="http://schemas.microsoft.com/office/drawing/2014/main" id="{470171EA-0CD0-9C02-6BB5-176A9F10C0C7}"/>
+              </a:ext>
+            </a:extLst>
+          </p:cNvPr>
+          <p:cNvPicPr>
+            <a:picLocks noGrp="1" noChangeAspect="1"/>
+          </p:cNvPicPr>
+          <p:nvPr>
+            <p:ph idx="1"/>
+          </p:nvPr>
+        </p:nvPicPr>
+        <p:blipFill>
+          <a:blip r:embed="rId2">
+            <a:extLst>
+              <a:ext uri="{28A0092B-C50C-407E-A947-70E740481C1C}">
+                <a14:useLocalDpi xmlns:a14="http://schemas.microsoft.com/office/drawing/2010/main" val="0"/>
+              </a:ext>
+            </a:extLst>
+          </a:blip>
+          <a:stretch>
+            <a:fillRect/>
+          </a:stretch>
+        </p:blipFill>
+        <p:spPr>
+          <a:xfrm>
+            <a:off x="782520" y="60865"/>
+            <a:ext cx="4659116" cy="2624636"/>
+          </a:xfrm>
+        </p:spPr>
+      </p:pic>
+      <p:sp>
+        <p:nvSpPr>
+          <p:cNvPr id="5" name="Title 1">
+            <a:extLst>
+              <a:ext uri="{FF2B5EF4-FFF2-40B4-BE49-F238E27FC236}">
+                <a16:creationId xmlns:a16="http://schemas.microsoft.com/office/drawing/2014/main" id="{42B5E7EE-9756-AFEC-C0CB-9FD405831C0D}"/>
+              </a:ext>
+            </a:extLst>
+          </p:cNvPr>
           <p:cNvSpPr>
             <a:spLocks noGrp="1"/>
           </p:cNvSpPr>
@@ -7337,76 +7548,330 @@
             <p:ph type="title"/>
           </p:nvPr>
         </p:nvSpPr>
-        <p:spPr/>
+        <p:spPr>
+          <a:xfrm>
+            <a:off x="-29497" y="-357439"/>
+            <a:ext cx="841513" cy="1325563"/>
+          </a:xfrm>
+        </p:spPr>
         <p:txBody>
           <a:bodyPr/>
           <a:lstStyle/>
           <a:p>
-            <a:endParaRPr lang="en-GB"/>
-          </a:p>
-        </p:txBody>
-      </p:sp>
-      <p:sp>
-        <p:nvSpPr>
-          <p:cNvPr id="3" name="Content Placeholder 2"/>
-          <p:cNvSpPr>
-            <a:spLocks noGrp="1"/>
-          </p:cNvSpPr>
-          <p:nvPr>
-            <p:ph idx="1"/>
-          </p:nvPr>
-        </p:nvSpPr>
-        <p:spPr/>
-        <p:txBody>
-          <a:bodyPr>
+            <a:r>
+              <a:rPr lang="en-GB" dirty="0"/>
+              <a:t>A</a:t>
+            </a:r>
+          </a:p>
+        </p:txBody>
+      </p:sp>
+      <p:pic>
+        <p:nvPicPr>
+          <p:cNvPr id="6" name="Picture 2" descr="figure 1">
+            <a:extLst>
+              <a:ext uri="{FF2B5EF4-FFF2-40B4-BE49-F238E27FC236}">
+                <a16:creationId xmlns:a16="http://schemas.microsoft.com/office/drawing/2014/main" id="{5BC4FC46-72F6-6B0A-D3B1-96EDFE99846F}"/>
+              </a:ext>
+            </a:extLst>
+          </p:cNvPr>
+          <p:cNvPicPr>
+            <a:picLocks noChangeAspect="1" noChangeArrowheads="1"/>
+          </p:cNvPicPr>
+          <p:nvPr/>
+        </p:nvPicPr>
+        <p:blipFill>
+          <a:blip r:embed="rId3">
+            <a:extLst>
+              <a:ext uri="{28A0092B-C50C-407E-A947-70E740481C1C}">
+                <a14:useLocalDpi xmlns:a14="http://schemas.microsoft.com/office/drawing/2010/main" val="0"/>
+              </a:ext>
+            </a:extLst>
+          </a:blip>
+          <a:srcRect/>
+          <a:stretch>
+            <a:fillRect/>
+          </a:stretch>
+        </p:blipFill>
+        <p:spPr bwMode="auto">
+          <a:xfrm>
+            <a:off x="6845872" y="140497"/>
+            <a:ext cx="5021663" cy="2705101"/>
+          </a:xfrm>
+          <a:prstGeom prst="rect">
+            <a:avLst/>
+          </a:prstGeom>
+          <a:noFill/>
+          <a:extLst>
+            <a:ext uri="{909E8E84-426E-40DD-AFC4-6F175D3DCCD1}">
+              <a14:hiddenFill xmlns:a14="http://schemas.microsoft.com/office/drawing/2010/main">
+                <a:solidFill>
+                  <a:srgbClr val="FFFFFF"/>
+                </a:solidFill>
+              </a14:hiddenFill>
+            </a:ext>
+          </a:extLst>
+        </p:spPr>
+      </p:pic>
+      <p:sp>
+        <p:nvSpPr>
+          <p:cNvPr id="7" name="Title 1">
+            <a:extLst>
+              <a:ext uri="{FF2B5EF4-FFF2-40B4-BE49-F238E27FC236}">
+                <a16:creationId xmlns:a16="http://schemas.microsoft.com/office/drawing/2014/main" id="{FAA0D175-871F-F5DD-2CFC-0D4CADC3EEDD}"/>
+              </a:ext>
+            </a:extLst>
+          </p:cNvPr>
+          <p:cNvSpPr txBox="1">
+            <a:spLocks/>
+          </p:cNvSpPr>
+          <p:nvPr/>
+        </p:nvSpPr>
+        <p:spPr>
+          <a:xfrm>
+            <a:off x="-1" y="2685501"/>
+            <a:ext cx="841513" cy="1325563"/>
+          </a:xfrm>
+          <a:prstGeom prst="rect">
+            <a:avLst/>
+          </a:prstGeom>
+        </p:spPr>
+        <p:txBody>
+          <a:bodyPr vert="horz" lIns="91440" tIns="45720" rIns="91440" bIns="45720" rtlCol="0" anchor="ctr">
             <a:normAutofit/>
           </a:bodyPr>
-          <a:lstStyle/>
-          <a:p>
-            <a:r>
-              <a:rPr lang="en-GB" sz="4400" dirty="0" smtClean="0"/>
-              <a:t>What are the +</a:t>
-            </a:r>
-            <a:r>
-              <a:rPr lang="en-GB" sz="4400" dirty="0" err="1" smtClean="0"/>
-              <a:t>ves</a:t>
-            </a:r>
-            <a:r>
-              <a:rPr lang="en-GB" sz="4400" dirty="0" smtClean="0"/>
-              <a:t>/-</a:t>
-            </a:r>
-            <a:r>
-              <a:rPr lang="en-GB" sz="4400" dirty="0" err="1" smtClean="0"/>
-              <a:t>ves</a:t>
-            </a:r>
-            <a:r>
-              <a:rPr lang="en-GB" sz="4400" dirty="0" smtClean="0"/>
-              <a:t> of each? </a:t>
-            </a:r>
-          </a:p>
-          <a:p>
-            <a:r>
-              <a:rPr lang="en-GB" sz="4400" dirty="0" smtClean="0"/>
-              <a:t>In which context would you want to use each figure?</a:t>
-            </a:r>
-          </a:p>
-          <a:p>
-            <a:r>
-              <a:rPr lang="en-GB" sz="4400" dirty="0" smtClean="0"/>
-              <a:t>How else might you illustrate </a:t>
-            </a:r>
-            <a:r>
-              <a:rPr lang="en-GB" sz="4400" smtClean="0"/>
-              <a:t>this system?</a:t>
-            </a:r>
-            <a:endParaRPr lang="en-GB" sz="4400" dirty="0"/>
+          <a:lstStyle>
+            <a:lvl1pPr algn="l" defTabSz="914400" rtl="0" eaLnBrk="1" latinLnBrk="0" hangingPunct="1">
+              <a:lnSpc>
+                <a:spcPct val="90000"/>
+              </a:lnSpc>
+              <a:spcBef>
+                <a:spcPct val="0"/>
+              </a:spcBef>
+              <a:buNone/>
+              <a:defRPr sz="4400" kern="1200">
+                <a:solidFill>
+                  <a:schemeClr val="tx1"/>
+                </a:solidFill>
+                <a:latin typeface="+mj-lt"/>
+                <a:ea typeface="+mj-ea"/>
+                <a:cs typeface="+mj-cs"/>
+              </a:defRPr>
+            </a:lvl1pPr>
+          </a:lstStyle>
+          <a:p>
+            <a:r>
+              <a:rPr lang="en-GB" dirty="0"/>
+              <a:t>C</a:t>
+            </a:r>
+          </a:p>
+        </p:txBody>
+      </p:sp>
+      <p:pic>
+        <p:nvPicPr>
+          <p:cNvPr id="8" name="Picture 2" descr="https://journals.asm.org/cms/10.1128/mBio.00815-17/asset/f9241635-b074-462a-9a12-a88ef5275191/assets/graphic/mbo0031733480007.jpeg">
+            <a:extLst>
+              <a:ext uri="{FF2B5EF4-FFF2-40B4-BE49-F238E27FC236}">
+                <a16:creationId xmlns:a16="http://schemas.microsoft.com/office/drawing/2014/main" id="{B52038FF-D039-6EF7-D49D-4BE9D2E0F137}"/>
+              </a:ext>
+            </a:extLst>
+          </p:cNvPr>
+          <p:cNvPicPr>
+            <a:picLocks noChangeAspect="1" noChangeArrowheads="1"/>
+          </p:cNvPicPr>
+          <p:nvPr/>
+        </p:nvPicPr>
+        <p:blipFill>
+          <a:blip r:embed="rId4">
+            <a:extLst>
+              <a:ext uri="{28A0092B-C50C-407E-A947-70E740481C1C}">
+                <a14:useLocalDpi xmlns:a14="http://schemas.microsoft.com/office/drawing/2010/main" val="0"/>
+              </a:ext>
+            </a:extLst>
+          </a:blip>
+          <a:srcRect/>
+          <a:stretch>
+            <a:fillRect/>
+          </a:stretch>
+        </p:blipFill>
+        <p:spPr bwMode="auto">
+          <a:xfrm>
+            <a:off x="782520" y="3336260"/>
+            <a:ext cx="4260052" cy="3411370"/>
+          </a:xfrm>
+          <a:prstGeom prst="rect">
+            <a:avLst/>
+          </a:prstGeom>
+          <a:noFill/>
+          <a:extLst>
+            <a:ext uri="{909E8E84-426E-40DD-AFC4-6F175D3DCCD1}">
+              <a14:hiddenFill xmlns:a14="http://schemas.microsoft.com/office/drawing/2010/main">
+                <a:solidFill>
+                  <a:srgbClr val="FFFFFF"/>
+                </a:solidFill>
+              </a14:hiddenFill>
+            </a:ext>
+          </a:extLst>
+        </p:spPr>
+      </p:pic>
+      <p:pic>
+        <p:nvPicPr>
+          <p:cNvPr id="9" name="Picture 2" descr="Details are in the caption following the image">
+            <a:extLst>
+              <a:ext uri="{FF2B5EF4-FFF2-40B4-BE49-F238E27FC236}">
+                <a16:creationId xmlns:a16="http://schemas.microsoft.com/office/drawing/2014/main" id="{2E6CA5ED-0456-C70C-D7F6-7D09AEEE2693}"/>
+              </a:ext>
+            </a:extLst>
+          </p:cNvPr>
+          <p:cNvPicPr>
+            <a:picLocks noChangeAspect="1" noChangeArrowheads="1"/>
+          </p:cNvPicPr>
+          <p:nvPr/>
+        </p:nvPicPr>
+        <p:blipFill>
+          <a:blip r:embed="rId5" cstate="print">
+            <a:extLst>
+              <a:ext uri="{28A0092B-C50C-407E-A947-70E740481C1C}">
+                <a14:useLocalDpi xmlns:a14="http://schemas.microsoft.com/office/drawing/2010/main" val="0"/>
+              </a:ext>
+            </a:extLst>
+          </a:blip>
+          <a:srcRect/>
+          <a:stretch>
+            <a:fillRect/>
+          </a:stretch>
+        </p:blipFill>
+        <p:spPr bwMode="auto">
+          <a:xfrm>
+            <a:off x="6611151" y="2949272"/>
+            <a:ext cx="5491104" cy="3798358"/>
+          </a:xfrm>
+          <a:prstGeom prst="rect">
+            <a:avLst/>
+          </a:prstGeom>
+          <a:noFill/>
+          <a:extLst>
+            <a:ext uri="{909E8E84-426E-40DD-AFC4-6F175D3DCCD1}">
+              <a14:hiddenFill xmlns:a14="http://schemas.microsoft.com/office/drawing/2010/main">
+                <a:solidFill>
+                  <a:srgbClr val="FFFFFF"/>
+                </a:solidFill>
+              </a14:hiddenFill>
+            </a:ext>
+          </a:extLst>
+        </p:spPr>
+      </p:pic>
+      <p:sp>
+        <p:nvSpPr>
+          <p:cNvPr id="10" name="Title 1">
+            <a:extLst>
+              <a:ext uri="{FF2B5EF4-FFF2-40B4-BE49-F238E27FC236}">
+                <a16:creationId xmlns:a16="http://schemas.microsoft.com/office/drawing/2014/main" id="{6263019A-58CB-2B83-C53C-46D05045C8FA}"/>
+              </a:ext>
+            </a:extLst>
+          </p:cNvPr>
+          <p:cNvSpPr txBox="1">
+            <a:spLocks/>
+          </p:cNvSpPr>
+          <p:nvPr/>
+        </p:nvSpPr>
+        <p:spPr>
+          <a:xfrm>
+            <a:off x="5803400" y="-357439"/>
+            <a:ext cx="841513" cy="1325563"/>
+          </a:xfrm>
+          <a:prstGeom prst="rect">
+            <a:avLst/>
+          </a:prstGeom>
+        </p:spPr>
+        <p:txBody>
+          <a:bodyPr vert="horz" lIns="91440" tIns="45720" rIns="91440" bIns="45720" rtlCol="0" anchor="ctr">
+            <a:normAutofit/>
+          </a:bodyPr>
+          <a:lstStyle>
+            <a:lvl1pPr algn="l" defTabSz="914400" rtl="0" eaLnBrk="1" latinLnBrk="0" hangingPunct="1">
+              <a:lnSpc>
+                <a:spcPct val="90000"/>
+              </a:lnSpc>
+              <a:spcBef>
+                <a:spcPct val="0"/>
+              </a:spcBef>
+              <a:buNone/>
+              <a:defRPr sz="4400" kern="1200">
+                <a:solidFill>
+                  <a:schemeClr val="tx1"/>
+                </a:solidFill>
+                <a:latin typeface="+mj-lt"/>
+                <a:ea typeface="+mj-ea"/>
+                <a:cs typeface="+mj-cs"/>
+              </a:defRPr>
+            </a:lvl1pPr>
+          </a:lstStyle>
+          <a:p>
+            <a:r>
+              <a:rPr lang="en-GB" dirty="0"/>
+              <a:t>B</a:t>
+            </a:r>
+          </a:p>
+        </p:txBody>
+      </p:sp>
+      <p:sp>
+        <p:nvSpPr>
+          <p:cNvPr id="11" name="Title 1">
+            <a:extLst>
+              <a:ext uri="{FF2B5EF4-FFF2-40B4-BE49-F238E27FC236}">
+                <a16:creationId xmlns:a16="http://schemas.microsoft.com/office/drawing/2014/main" id="{059AA609-1A9B-7568-9424-B8455B4788AA}"/>
+              </a:ext>
+            </a:extLst>
+          </p:cNvPr>
+          <p:cNvSpPr txBox="1">
+            <a:spLocks/>
+          </p:cNvSpPr>
+          <p:nvPr/>
+        </p:nvSpPr>
+        <p:spPr>
+          <a:xfrm>
+            <a:off x="5669158" y="2685501"/>
+            <a:ext cx="841513" cy="1325563"/>
+          </a:xfrm>
+          <a:prstGeom prst="rect">
+            <a:avLst/>
+          </a:prstGeom>
+        </p:spPr>
+        <p:txBody>
+          <a:bodyPr vert="horz" lIns="91440" tIns="45720" rIns="91440" bIns="45720" rtlCol="0" anchor="ctr">
+            <a:normAutofit/>
+          </a:bodyPr>
+          <a:lstStyle>
+            <a:lvl1pPr algn="l" defTabSz="914400" rtl="0" eaLnBrk="1" latinLnBrk="0" hangingPunct="1">
+              <a:lnSpc>
+                <a:spcPct val="90000"/>
+              </a:lnSpc>
+              <a:spcBef>
+                <a:spcPct val="0"/>
+              </a:spcBef>
+              <a:buNone/>
+              <a:defRPr sz="4400" kern="1200">
+                <a:solidFill>
+                  <a:schemeClr val="tx1"/>
+                </a:solidFill>
+                <a:latin typeface="+mj-lt"/>
+                <a:ea typeface="+mj-ea"/>
+                <a:cs typeface="+mj-cs"/>
+              </a:defRPr>
+            </a:lvl1pPr>
+          </a:lstStyle>
+          <a:p>
+            <a:r>
+              <a:rPr lang="en-GB" dirty="0"/>
+              <a:t>D</a:t>
+            </a:r>
           </a:p>
         </p:txBody>
       </p:sp>
     </p:spTree>
     <p:extLst>
       <p:ext uri="{BB962C8B-B14F-4D97-AF65-F5344CB8AC3E}">
-        <p14:creationId xmlns:p14="http://schemas.microsoft.com/office/powerpoint/2010/main" val="4002265655"/>
+        <p14:creationId xmlns:p14="http://schemas.microsoft.com/office/powerpoint/2010/main" val="387199111"/>
       </p:ext>
     </p:extLst>
   </p:cSld>

</xml_diff>